<commit_message>
Update 0515 project06 - 파워포인트 - 서희.pptx
</commit_message>
<xml_diff>
--- a/0 발표용 파워포인트/0515 2차발표/0515 project06 - 파워포인트 - 서희.pptx
+++ b/0 발표용 파워포인트/0515 2차발표/0515 project06 - 파워포인트 - 서희.pptx
@@ -5,7 +5,7 @@
     <p:sldMasterId id="2147483648" r:id="rId1"/>
   </p:sldMasterIdLst>
   <p:notesMasterIdLst>
-    <p:notesMasterId r:id="rId16"/>
+    <p:notesMasterId r:id="rId18"/>
   </p:notesMasterIdLst>
   <p:sldIdLst>
     <p:sldId id="258" r:id="rId2"/>
@@ -22,6 +22,8 @@
     <p:sldId id="270" r:id="rId13"/>
     <p:sldId id="262" r:id="rId14"/>
     <p:sldId id="271" r:id="rId15"/>
+    <p:sldId id="276" r:id="rId16"/>
+    <p:sldId id="275" r:id="rId17"/>
   </p:sldIdLst>
   <p:sldSz cx="12192000" cy="6858000"/>
   <p:notesSz cx="6858000" cy="9144000"/>
@@ -122,7 +124,7 @@
   </p:defaultTextStyle>
   <p:extLst>
     <p:ext uri="{EFAFB233-063F-42B5-8137-9DF3F51BA10A}">
-      <p15:sldGuideLst xmlns="" xmlns:p15="http://schemas.microsoft.com/office/powerpoint/2012/main">
+      <p15:sldGuideLst xmlns:p15="http://schemas.microsoft.com/office/powerpoint/2012/main" xmlns="">
         <p15:guide id="1" orient="horz" pos="2160">
           <p15:clr>
             <a:srgbClr val="A4A3A4"/>
@@ -4186,7 +4188,7 @@
                 <a:gridCol w="2688299">
                   <a:extLst>
                     <a:ext uri="{9D8B030D-6E8A-4147-A177-3AD203B41FA5}">
-                      <a16:colId xmlns="" xmlns:a16="http://schemas.microsoft.com/office/drawing/2014/main" val="20000"/>
+                      <a16:colId xmlns:a16="http://schemas.microsoft.com/office/drawing/2014/main" xmlns="" val="20000"/>
                     </a:ext>
                   </a:extLst>
                 </a:gridCol>
@@ -4218,7 +4220,7 @@
                 </a:tc>
                 <a:extLst>
                   <a:ext uri="{0D108BD9-81ED-4DB2-BD59-A6C34878D82A}">
-                    <a16:rowId xmlns="" xmlns:a16="http://schemas.microsoft.com/office/drawing/2014/main" val="10000"/>
+                    <a16:rowId xmlns:a16="http://schemas.microsoft.com/office/drawing/2014/main" xmlns="" val="10000"/>
                   </a:ext>
                 </a:extLst>
               </a:tr>
@@ -4246,7 +4248,7 @@
                 </a:tc>
                 <a:extLst>
                   <a:ext uri="{0D108BD9-81ED-4DB2-BD59-A6C34878D82A}">
-                    <a16:rowId xmlns="" xmlns:a16="http://schemas.microsoft.com/office/drawing/2014/main" val="10001"/>
+                    <a16:rowId xmlns:a16="http://schemas.microsoft.com/office/drawing/2014/main" xmlns="" val="10001"/>
                   </a:ext>
                 </a:extLst>
               </a:tr>
@@ -4280,14 +4282,14 @@
                 <a:gridCol w="280507">
                   <a:extLst>
                     <a:ext uri="{9D8B030D-6E8A-4147-A177-3AD203B41FA5}">
-                      <a16:colId xmlns="" xmlns:a16="http://schemas.microsoft.com/office/drawing/2014/main" val="20000"/>
+                      <a16:colId xmlns:a16="http://schemas.microsoft.com/office/drawing/2014/main" xmlns="" val="20000"/>
                     </a:ext>
                   </a:extLst>
                 </a:gridCol>
                 <a:gridCol w="2407792">
                   <a:extLst>
                     <a:ext uri="{9D8B030D-6E8A-4147-A177-3AD203B41FA5}">
-                      <a16:colId xmlns="" xmlns:a16="http://schemas.microsoft.com/office/drawing/2014/main" val="20001"/>
+                      <a16:colId xmlns:a16="http://schemas.microsoft.com/office/drawing/2014/main" xmlns="" val="20001"/>
                     </a:ext>
                   </a:extLst>
                 </a:gridCol>
@@ -4349,7 +4351,7 @@
                 </a:tc>
                 <a:extLst>
                   <a:ext uri="{0D108BD9-81ED-4DB2-BD59-A6C34878D82A}">
-                    <a16:rowId xmlns="" xmlns:a16="http://schemas.microsoft.com/office/drawing/2014/main" val="10000"/>
+                    <a16:rowId xmlns:a16="http://schemas.microsoft.com/office/drawing/2014/main" xmlns="" val="10000"/>
                   </a:ext>
                 </a:extLst>
               </a:tr>
@@ -4441,7 +4443,7 @@
                 </a:tc>
                 <a:extLst>
                   <a:ext uri="{0D108BD9-81ED-4DB2-BD59-A6C34878D82A}">
-                    <a16:rowId xmlns="" xmlns:a16="http://schemas.microsoft.com/office/drawing/2014/main" val="10001"/>
+                    <a16:rowId xmlns:a16="http://schemas.microsoft.com/office/drawing/2014/main" xmlns="" val="10001"/>
                   </a:ext>
                 </a:extLst>
               </a:tr>
@@ -4551,7 +4553,7 @@
                 </a:tc>
                 <a:extLst>
                   <a:ext uri="{0D108BD9-81ED-4DB2-BD59-A6C34878D82A}">
-                    <a16:rowId xmlns="" xmlns:a16="http://schemas.microsoft.com/office/drawing/2014/main" val="10002"/>
+                    <a16:rowId xmlns:a16="http://schemas.microsoft.com/office/drawing/2014/main" xmlns="" val="10002"/>
                   </a:ext>
                 </a:extLst>
               </a:tr>
@@ -4676,7 +4678,7 @@
                 </a:tc>
                 <a:extLst>
                   <a:ext uri="{0D108BD9-81ED-4DB2-BD59-A6C34878D82A}">
-                    <a16:rowId xmlns="" xmlns:a16="http://schemas.microsoft.com/office/drawing/2014/main" val="10003"/>
+                    <a16:rowId xmlns:a16="http://schemas.microsoft.com/office/drawing/2014/main" xmlns="" val="10003"/>
                   </a:ext>
                 </a:extLst>
               </a:tr>
@@ -4822,7 +4824,7 @@
                 </a:tc>
                 <a:extLst>
                   <a:ext uri="{0D108BD9-81ED-4DB2-BD59-A6C34878D82A}">
-                    <a16:rowId xmlns="" xmlns:a16="http://schemas.microsoft.com/office/drawing/2014/main" val="10004"/>
+                    <a16:rowId xmlns:a16="http://schemas.microsoft.com/office/drawing/2014/main" xmlns="" val="10004"/>
                   </a:ext>
                 </a:extLst>
               </a:tr>
@@ -10530,7 +10532,7 @@
                 <a:gridCol w="2688299">
                   <a:extLst>
                     <a:ext uri="{9D8B030D-6E8A-4147-A177-3AD203B41FA5}">
-                      <a16:colId xmlns="" xmlns:a16="http://schemas.microsoft.com/office/drawing/2014/main" val="20000"/>
+                      <a16:colId xmlns:a16="http://schemas.microsoft.com/office/drawing/2014/main" xmlns="" val="20000"/>
                     </a:ext>
                   </a:extLst>
                 </a:gridCol>
@@ -10562,7 +10564,7 @@
                 </a:tc>
                 <a:extLst>
                   <a:ext uri="{0D108BD9-81ED-4DB2-BD59-A6C34878D82A}">
-                    <a16:rowId xmlns="" xmlns:a16="http://schemas.microsoft.com/office/drawing/2014/main" val="10000"/>
+                    <a16:rowId xmlns:a16="http://schemas.microsoft.com/office/drawing/2014/main" xmlns="" val="10000"/>
                   </a:ext>
                 </a:extLst>
               </a:tr>
@@ -10590,7 +10592,7 @@
                 </a:tc>
                 <a:extLst>
                   <a:ext uri="{0D108BD9-81ED-4DB2-BD59-A6C34878D82A}">
-                    <a16:rowId xmlns="" xmlns:a16="http://schemas.microsoft.com/office/drawing/2014/main" val="10001"/>
+                    <a16:rowId xmlns:a16="http://schemas.microsoft.com/office/drawing/2014/main" xmlns="" val="10001"/>
                   </a:ext>
                 </a:extLst>
               </a:tr>
@@ -10624,14 +10626,14 @@
                 <a:gridCol w="280507">
                   <a:extLst>
                     <a:ext uri="{9D8B030D-6E8A-4147-A177-3AD203B41FA5}">
-                      <a16:colId xmlns="" xmlns:a16="http://schemas.microsoft.com/office/drawing/2014/main" val="20000"/>
+                      <a16:colId xmlns:a16="http://schemas.microsoft.com/office/drawing/2014/main" xmlns="" val="20000"/>
                     </a:ext>
                   </a:extLst>
                 </a:gridCol>
                 <a:gridCol w="2407792">
                   <a:extLst>
                     <a:ext uri="{9D8B030D-6E8A-4147-A177-3AD203B41FA5}">
-                      <a16:colId xmlns="" xmlns:a16="http://schemas.microsoft.com/office/drawing/2014/main" val="20001"/>
+                      <a16:colId xmlns:a16="http://schemas.microsoft.com/office/drawing/2014/main" xmlns="" val="20001"/>
                     </a:ext>
                   </a:extLst>
                 </a:gridCol>
@@ -10693,7 +10695,7 @@
                 </a:tc>
                 <a:extLst>
                   <a:ext uri="{0D108BD9-81ED-4DB2-BD59-A6C34878D82A}">
-                    <a16:rowId xmlns="" xmlns:a16="http://schemas.microsoft.com/office/drawing/2014/main" val="10000"/>
+                    <a16:rowId xmlns:a16="http://schemas.microsoft.com/office/drawing/2014/main" xmlns="" val="10000"/>
                   </a:ext>
                 </a:extLst>
               </a:tr>
@@ -10841,7 +10843,7 @@
                 </a:tc>
                 <a:extLst>
                   <a:ext uri="{0D108BD9-81ED-4DB2-BD59-A6C34878D82A}">
-                    <a16:rowId xmlns="" xmlns:a16="http://schemas.microsoft.com/office/drawing/2014/main" val="10001"/>
+                    <a16:rowId xmlns:a16="http://schemas.microsoft.com/office/drawing/2014/main" xmlns="" val="10001"/>
                   </a:ext>
                 </a:extLst>
               </a:tr>
@@ -11093,7 +11095,7 @@
           <p:cNvPr id="43" name="그룹 36">
             <a:extLst>
               <a:ext uri="{FF2B5EF4-FFF2-40B4-BE49-F238E27FC236}">
-                <a16:creationId xmlns="" xmlns:a16="http://schemas.microsoft.com/office/drawing/2014/main" id="{18D6D656-6CB7-4BC7-96BC-AA35F78F28ED}"/>
+                <a16:creationId xmlns:a16="http://schemas.microsoft.com/office/drawing/2014/main" xmlns="" id="{18D6D656-6CB7-4BC7-96BC-AA35F78F28ED}"/>
               </a:ext>
             </a:extLst>
           </p:cNvPr>
@@ -11113,7 +11115,7 @@
             <p:cNvPr id="51" name="직사각형 49">
               <a:extLst>
                 <a:ext uri="{FF2B5EF4-FFF2-40B4-BE49-F238E27FC236}">
-                  <a16:creationId xmlns="" xmlns:a16="http://schemas.microsoft.com/office/drawing/2014/main" id="{5DFA35AB-205F-4BB9-98A2-4B0EA566278D}"/>
+                  <a16:creationId xmlns:a16="http://schemas.microsoft.com/office/drawing/2014/main" xmlns="" id="{5DFA35AB-205F-4BB9-98A2-4B0EA566278D}"/>
                 </a:ext>
               </a:extLst>
             </p:cNvPr>
@@ -11172,7 +11174,7 @@
             <p:cNvPr id="52" name="Picture 2">
               <a:extLst>
                 <a:ext uri="{FF2B5EF4-FFF2-40B4-BE49-F238E27FC236}">
-                  <a16:creationId xmlns="" xmlns:a16="http://schemas.microsoft.com/office/drawing/2014/main" id="{B27C3D8A-F700-4BE7-8D21-0F05E749AFDE}"/>
+                  <a16:creationId xmlns:a16="http://schemas.microsoft.com/office/drawing/2014/main" xmlns="" id="{B27C3D8A-F700-4BE7-8D21-0F05E749AFDE}"/>
                 </a:ext>
               </a:extLst>
             </p:cNvPr>
@@ -11242,7 +11244,7 @@
             <p:cNvPr id="53" name="직사각형 51">
               <a:extLst>
                 <a:ext uri="{FF2B5EF4-FFF2-40B4-BE49-F238E27FC236}">
-                  <a16:creationId xmlns="" xmlns:a16="http://schemas.microsoft.com/office/drawing/2014/main" id="{ABAEC106-523B-414C-B192-870ED5DA7867}"/>
+                  <a16:creationId xmlns:a16="http://schemas.microsoft.com/office/drawing/2014/main" xmlns="" id="{ABAEC106-523B-414C-B192-870ED5DA7867}"/>
                 </a:ext>
               </a:extLst>
             </p:cNvPr>
@@ -11326,7 +11328,7 @@
             <p:cNvPr id="54" name="직사각형 52">
               <a:extLst>
                 <a:ext uri="{FF2B5EF4-FFF2-40B4-BE49-F238E27FC236}">
-                  <a16:creationId xmlns="" xmlns:a16="http://schemas.microsoft.com/office/drawing/2014/main" id="{32B0006D-0022-498F-976D-6C0225244373}"/>
+                  <a16:creationId xmlns:a16="http://schemas.microsoft.com/office/drawing/2014/main" xmlns="" id="{32B0006D-0022-498F-976D-6C0225244373}"/>
                 </a:ext>
               </a:extLst>
             </p:cNvPr>
@@ -11391,7 +11393,7 @@
             <p:cNvPr id="55" name="직사각형 53">
               <a:extLst>
                 <a:ext uri="{FF2B5EF4-FFF2-40B4-BE49-F238E27FC236}">
-                  <a16:creationId xmlns="" xmlns:a16="http://schemas.microsoft.com/office/drawing/2014/main" id="{CA8E2B83-C8D7-4508-A117-ECADA57E0F1F}"/>
+                  <a16:creationId xmlns:a16="http://schemas.microsoft.com/office/drawing/2014/main" xmlns="" id="{CA8E2B83-C8D7-4508-A117-ECADA57E0F1F}"/>
                 </a:ext>
               </a:extLst>
             </p:cNvPr>
@@ -11455,7 +11457,7 @@
             <p:cNvPr id="56" name="직사각형 59">
               <a:extLst>
                 <a:ext uri="{FF2B5EF4-FFF2-40B4-BE49-F238E27FC236}">
-                  <a16:creationId xmlns="" xmlns:a16="http://schemas.microsoft.com/office/drawing/2014/main" id="{84BD68A9-C620-4063-B146-98D7AE202EC0}"/>
+                  <a16:creationId xmlns:a16="http://schemas.microsoft.com/office/drawing/2014/main" xmlns="" id="{84BD68A9-C620-4063-B146-98D7AE202EC0}"/>
                 </a:ext>
               </a:extLst>
             </p:cNvPr>
@@ -11549,7 +11551,7 @@
           <p:cNvPr id="57" name="그룹 36">
             <a:extLst>
               <a:ext uri="{FF2B5EF4-FFF2-40B4-BE49-F238E27FC236}">
-                <a16:creationId xmlns="" xmlns:a16="http://schemas.microsoft.com/office/drawing/2014/main" id="{DDF5813C-E7B7-4FC4-9DD9-D0B0D2D6DE11}"/>
+                <a16:creationId xmlns:a16="http://schemas.microsoft.com/office/drawing/2014/main" xmlns="" id="{DDF5813C-E7B7-4FC4-9DD9-D0B0D2D6DE11}"/>
               </a:ext>
             </a:extLst>
           </p:cNvPr>
@@ -11569,7 +11571,7 @@
             <p:cNvPr id="58" name="직사각형 49">
               <a:extLst>
                 <a:ext uri="{FF2B5EF4-FFF2-40B4-BE49-F238E27FC236}">
-                  <a16:creationId xmlns="" xmlns:a16="http://schemas.microsoft.com/office/drawing/2014/main" id="{9AB36AA4-3375-4487-B379-F7C950D1FAF0}"/>
+                  <a16:creationId xmlns:a16="http://schemas.microsoft.com/office/drawing/2014/main" xmlns="" id="{9AB36AA4-3375-4487-B379-F7C950D1FAF0}"/>
                 </a:ext>
               </a:extLst>
             </p:cNvPr>
@@ -11628,7 +11630,7 @@
             <p:cNvPr id="59" name="Picture 2">
               <a:extLst>
                 <a:ext uri="{FF2B5EF4-FFF2-40B4-BE49-F238E27FC236}">
-                  <a16:creationId xmlns="" xmlns:a16="http://schemas.microsoft.com/office/drawing/2014/main" id="{F52977A8-3123-4D10-AF25-16CF017D9CAE}"/>
+                  <a16:creationId xmlns:a16="http://schemas.microsoft.com/office/drawing/2014/main" xmlns="" id="{F52977A8-3123-4D10-AF25-16CF017D9CAE}"/>
                 </a:ext>
               </a:extLst>
             </p:cNvPr>
@@ -11698,7 +11700,7 @@
             <p:cNvPr id="60" name="직사각형 51">
               <a:extLst>
                 <a:ext uri="{FF2B5EF4-FFF2-40B4-BE49-F238E27FC236}">
-                  <a16:creationId xmlns="" xmlns:a16="http://schemas.microsoft.com/office/drawing/2014/main" id="{ECDF853D-7AE6-4B9F-906F-E0C1123BAEA0}"/>
+                  <a16:creationId xmlns:a16="http://schemas.microsoft.com/office/drawing/2014/main" xmlns="" id="{ECDF853D-7AE6-4B9F-906F-E0C1123BAEA0}"/>
                 </a:ext>
               </a:extLst>
             </p:cNvPr>
@@ -11782,7 +11784,7 @@
             <p:cNvPr id="61" name="직사각형 52">
               <a:extLst>
                 <a:ext uri="{FF2B5EF4-FFF2-40B4-BE49-F238E27FC236}">
-                  <a16:creationId xmlns="" xmlns:a16="http://schemas.microsoft.com/office/drawing/2014/main" id="{E530D239-7B5C-4D49-90FC-8452393AF7A4}"/>
+                  <a16:creationId xmlns:a16="http://schemas.microsoft.com/office/drawing/2014/main" xmlns="" id="{E530D239-7B5C-4D49-90FC-8452393AF7A4}"/>
                 </a:ext>
               </a:extLst>
             </p:cNvPr>
@@ -11847,7 +11849,7 @@
             <p:cNvPr id="62" name="직사각형 53">
               <a:extLst>
                 <a:ext uri="{FF2B5EF4-FFF2-40B4-BE49-F238E27FC236}">
-                  <a16:creationId xmlns="" xmlns:a16="http://schemas.microsoft.com/office/drawing/2014/main" id="{4EC57A97-C4A4-4247-9748-C5E8A3B74796}"/>
+                  <a16:creationId xmlns:a16="http://schemas.microsoft.com/office/drawing/2014/main" xmlns="" id="{4EC57A97-C4A4-4247-9748-C5E8A3B74796}"/>
                 </a:ext>
               </a:extLst>
             </p:cNvPr>
@@ -11911,7 +11913,7 @@
             <p:cNvPr id="63" name="직사각형 59">
               <a:extLst>
                 <a:ext uri="{FF2B5EF4-FFF2-40B4-BE49-F238E27FC236}">
-                  <a16:creationId xmlns="" xmlns:a16="http://schemas.microsoft.com/office/drawing/2014/main" id="{3F7A45D3-FB1E-492F-A173-180E410908EF}"/>
+                  <a16:creationId xmlns:a16="http://schemas.microsoft.com/office/drawing/2014/main" xmlns="" id="{3F7A45D3-FB1E-492F-A173-180E410908EF}"/>
                 </a:ext>
               </a:extLst>
             </p:cNvPr>
@@ -11992,7 +11994,7 @@
           <p:cNvPr id="3" name="Speech Bubble: Rectangle 2">
             <a:extLst>
               <a:ext uri="{FF2B5EF4-FFF2-40B4-BE49-F238E27FC236}">
-                <a16:creationId xmlns="" xmlns:a16="http://schemas.microsoft.com/office/drawing/2014/main" id="{BC613F83-282A-4751-BABC-F068076753CF}"/>
+                <a16:creationId xmlns:a16="http://schemas.microsoft.com/office/drawing/2014/main" xmlns="" id="{BC613F83-282A-4751-BABC-F068076753CF}"/>
               </a:ext>
             </a:extLst>
           </p:cNvPr>
@@ -12713,6 +12715,3891 @@
     <p:extLst>
       <p:ext uri="{BB962C8B-B14F-4D97-AF65-F5344CB8AC3E}">
         <p14:creationId xmlns:p14="http://schemas.microsoft.com/office/powerpoint/2010/main" val="2307572303"/>
+      </p:ext>
+    </p:extLst>
+  </p:cSld>
+  <p:clrMapOvr>
+    <a:masterClrMapping/>
+  </p:clrMapOvr>
+  <p:timing>
+    <p:tnLst>
+      <p:par>
+        <p:cTn id="1" dur="indefinite" restart="never" nodeType="tmRoot"/>
+      </p:par>
+    </p:tnLst>
+  </p:timing>
+</p:sld>
+</file>
+
+<file path=ppt/slides/slide15.xml><?xml version="1.0" encoding="utf-8"?>
+<p:sld xmlns:a="http://schemas.openxmlformats.org/drawingml/2006/main" xmlns:r="http://schemas.openxmlformats.org/officeDocument/2006/relationships" xmlns:p="http://schemas.openxmlformats.org/presentationml/2006/main">
+  <p:cSld>
+    <p:spTree>
+      <p:nvGrpSpPr>
+        <p:cNvPr id="1" name=""/>
+        <p:cNvGrpSpPr/>
+        <p:nvPr/>
+      </p:nvGrpSpPr>
+      <p:grpSpPr>
+        <a:xfrm>
+          <a:off x="0" y="0"/>
+          <a:ext cx="0" cy="0"/>
+          <a:chOff x="0" y="0"/>
+          <a:chExt cx="0" cy="0"/>
+        </a:xfrm>
+      </p:grpSpPr>
+      <p:sp>
+        <p:nvSpPr>
+          <p:cNvPr id="18" name="직사각형 17"/>
+          <p:cNvSpPr/>
+          <p:nvPr/>
+        </p:nvSpPr>
+        <p:spPr>
+          <a:xfrm rot="21409477">
+            <a:off x="832974" y="128931"/>
+            <a:ext cx="9282799" cy="6218171"/>
+          </a:xfrm>
+          <a:prstGeom prst="rect">
+            <a:avLst/>
+          </a:prstGeom>
+          <a:solidFill>
+            <a:schemeClr val="bg1">
+              <a:lumMod val="95000"/>
+            </a:schemeClr>
+          </a:solidFill>
+          <a:ln>
+            <a:noFill/>
+          </a:ln>
+        </p:spPr>
+        <p:style>
+          <a:lnRef idx="2">
+            <a:schemeClr val="accent1">
+              <a:shade val="50000"/>
+            </a:schemeClr>
+          </a:lnRef>
+          <a:fillRef idx="1">
+            <a:schemeClr val="accent1"/>
+          </a:fillRef>
+          <a:effectRef idx="0">
+            <a:schemeClr val="accent1"/>
+          </a:effectRef>
+          <a:fontRef idx="minor">
+            <a:schemeClr val="lt1"/>
+          </a:fontRef>
+        </p:style>
+        <p:txBody>
+          <a:bodyPr lIns="91438" tIns="45719" rIns="91438" bIns="45719" rtlCol="0" anchor="ctr"/>
+          <a:lstStyle/>
+          <a:p>
+            <a:pPr algn="ctr"/>
+            <a:endParaRPr lang="ko-KR" altLang="en-US" dirty="0">
+              <a:latin typeface="나눔바른고딕" panose="020B0603020101020101" pitchFamily="50" charset="-127"/>
+              <a:ea typeface="나눔바른고딕" panose="020B0603020101020101" pitchFamily="50" charset="-127"/>
+            </a:endParaRPr>
+          </a:p>
+        </p:txBody>
+      </p:sp>
+      <p:sp>
+        <p:nvSpPr>
+          <p:cNvPr id="5" name="직사각형 4"/>
+          <p:cNvSpPr/>
+          <p:nvPr/>
+        </p:nvSpPr>
+        <p:spPr>
+          <a:xfrm>
+            <a:off x="526742" y="260649"/>
+            <a:ext cx="11425909" cy="6392929"/>
+          </a:xfrm>
+          <a:prstGeom prst="rect">
+            <a:avLst/>
+          </a:prstGeom>
+          <a:gradFill flip="none" rotWithShape="1">
+            <a:gsLst>
+              <a:gs pos="100000">
+                <a:schemeClr val="bg1">
+                  <a:shade val="67500"/>
+                  <a:satMod val="115000"/>
+                </a:schemeClr>
+              </a:gs>
+              <a:gs pos="64000">
+                <a:schemeClr val="bg1">
+                  <a:shade val="100000"/>
+                  <a:satMod val="115000"/>
+                </a:schemeClr>
+              </a:gs>
+            </a:gsLst>
+            <a:lin ang="10800000" scaled="1"/>
+            <a:tileRect/>
+          </a:gradFill>
+          <a:ln>
+            <a:noFill/>
+          </a:ln>
+          <a:effectLst>
+            <a:outerShdw blurRad="228600" dist="76200" dir="16200000" rotWithShape="0">
+              <a:prstClr val="black">
+                <a:alpha val="40000"/>
+              </a:prstClr>
+            </a:outerShdw>
+          </a:effectLst>
+        </p:spPr>
+        <p:style>
+          <a:lnRef idx="2">
+            <a:schemeClr val="accent1">
+              <a:shade val="50000"/>
+            </a:schemeClr>
+          </a:lnRef>
+          <a:fillRef idx="1">
+            <a:schemeClr val="accent1"/>
+          </a:fillRef>
+          <a:effectRef idx="0">
+            <a:schemeClr val="accent1"/>
+          </a:effectRef>
+          <a:fontRef idx="minor">
+            <a:schemeClr val="lt1"/>
+          </a:fontRef>
+        </p:style>
+        <p:txBody>
+          <a:bodyPr lIns="91438" tIns="45719" rIns="91438" bIns="45719" rtlCol="0" anchor="ctr"/>
+          <a:lstStyle/>
+          <a:p>
+            <a:pPr algn="ctr"/>
+            <a:endParaRPr lang="ko-KR" altLang="en-US" dirty="0">
+              <a:latin typeface="나눔바른고딕" panose="020B0603020101020101" pitchFamily="50" charset="-127"/>
+              <a:ea typeface="나눔바른고딕" panose="020B0603020101020101" pitchFamily="50" charset="-127"/>
+            </a:endParaRPr>
+          </a:p>
+        </p:txBody>
+      </p:sp>
+      <p:grpSp>
+        <p:nvGrpSpPr>
+          <p:cNvPr id="2" name="그룹 1"/>
+          <p:cNvGrpSpPr/>
+          <p:nvPr/>
+        </p:nvGrpSpPr>
+        <p:grpSpPr>
+          <a:xfrm>
+            <a:off x="143104" y="68627"/>
+            <a:ext cx="768321" cy="6704028"/>
+            <a:chOff x="586490" y="739768"/>
+            <a:chExt cx="1017302" cy="5420168"/>
+          </a:xfrm>
+        </p:grpSpPr>
+        <p:sp>
+          <p:nvSpPr>
+            <p:cNvPr id="39" name="자유형 38"/>
+            <p:cNvSpPr/>
+            <p:nvPr/>
+          </p:nvSpPr>
+          <p:spPr>
+            <a:xfrm rot="10800000">
+              <a:off x="586490" y="1041378"/>
+              <a:ext cx="1017302" cy="4991063"/>
+            </a:xfrm>
+            <a:custGeom>
+              <a:avLst/>
+              <a:gdLst>
+                <a:gd name="connsiteX0" fmla="*/ 194310 w 388620"/>
+                <a:gd name="connsiteY0" fmla="*/ 0 h 2927235"/>
+                <a:gd name="connsiteX1" fmla="*/ 388620 w 388620"/>
+                <a:gd name="connsiteY1" fmla="*/ 194310 h 2927235"/>
+                <a:gd name="connsiteX2" fmla="*/ 388620 w 388620"/>
+                <a:gd name="connsiteY2" fmla="*/ 2927235 h 2927235"/>
+                <a:gd name="connsiteX3" fmla="*/ 379599 w 388620"/>
+                <a:gd name="connsiteY3" fmla="*/ 2898175 h 2927235"/>
+                <a:gd name="connsiteX4" fmla="*/ 194310 w 388620"/>
+                <a:gd name="connsiteY4" fmla="*/ 2775357 h 2927235"/>
+                <a:gd name="connsiteX5" fmla="*/ 9021 w 388620"/>
+                <a:gd name="connsiteY5" fmla="*/ 2898175 h 2927235"/>
+                <a:gd name="connsiteX6" fmla="*/ 0 w 388620"/>
+                <a:gd name="connsiteY6" fmla="*/ 2927235 h 2927235"/>
+                <a:gd name="connsiteX7" fmla="*/ 0 w 388620"/>
+                <a:gd name="connsiteY7" fmla="*/ 194310 h 2927235"/>
+                <a:gd name="connsiteX8" fmla="*/ 194310 w 388620"/>
+                <a:gd name="connsiteY8" fmla="*/ 0 h 2927235"/>
+              </a:gdLst>
+              <a:ahLst/>
+              <a:cxnLst>
+                <a:cxn ang="0">
+                  <a:pos x="connsiteX0" y="connsiteY0"/>
+                </a:cxn>
+                <a:cxn ang="0">
+                  <a:pos x="connsiteX1" y="connsiteY1"/>
+                </a:cxn>
+                <a:cxn ang="0">
+                  <a:pos x="connsiteX2" y="connsiteY2"/>
+                </a:cxn>
+                <a:cxn ang="0">
+                  <a:pos x="connsiteX3" y="connsiteY3"/>
+                </a:cxn>
+                <a:cxn ang="0">
+                  <a:pos x="connsiteX4" y="connsiteY4"/>
+                </a:cxn>
+                <a:cxn ang="0">
+                  <a:pos x="connsiteX5" y="connsiteY5"/>
+                </a:cxn>
+                <a:cxn ang="0">
+                  <a:pos x="connsiteX6" y="connsiteY6"/>
+                </a:cxn>
+                <a:cxn ang="0">
+                  <a:pos x="connsiteX7" y="connsiteY7"/>
+                </a:cxn>
+                <a:cxn ang="0">
+                  <a:pos x="connsiteX8" y="connsiteY8"/>
+                </a:cxn>
+              </a:cxnLst>
+              <a:rect l="l" t="t" r="r" b="b"/>
+              <a:pathLst>
+                <a:path w="388620" h="2927235">
+                  <a:moveTo>
+                    <a:pt x="194310" y="0"/>
+                  </a:moveTo>
+                  <a:cubicBezTo>
+                    <a:pt x="301624" y="0"/>
+                    <a:pt x="388620" y="86996"/>
+                    <a:pt x="388620" y="194310"/>
+                  </a:cubicBezTo>
+                  <a:lnTo>
+                    <a:pt x="388620" y="2927235"/>
+                  </a:lnTo>
+                  <a:lnTo>
+                    <a:pt x="379599" y="2898175"/>
+                  </a:lnTo>
+                  <a:cubicBezTo>
+                    <a:pt x="349072" y="2826000"/>
+                    <a:pt x="277605" y="2775357"/>
+                    <a:pt x="194310" y="2775357"/>
+                  </a:cubicBezTo>
+                  <a:cubicBezTo>
+                    <a:pt x="111015" y="2775357"/>
+                    <a:pt x="39548" y="2826000"/>
+                    <a:pt x="9021" y="2898175"/>
+                  </a:cubicBezTo>
+                  <a:lnTo>
+                    <a:pt x="0" y="2927235"/>
+                  </a:lnTo>
+                  <a:lnTo>
+                    <a:pt x="0" y="194310"/>
+                  </a:lnTo>
+                  <a:cubicBezTo>
+                    <a:pt x="0" y="86996"/>
+                    <a:pt x="86996" y="0"/>
+                    <a:pt x="194310" y="0"/>
+                  </a:cubicBezTo>
+                  <a:close/>
+                </a:path>
+              </a:pathLst>
+            </a:custGeom>
+            <a:gradFill flip="none" rotWithShape="1">
+              <a:gsLst>
+                <a:gs pos="0">
+                  <a:schemeClr val="bg1">
+                    <a:shade val="67500"/>
+                    <a:satMod val="115000"/>
+                  </a:schemeClr>
+                </a:gs>
+                <a:gs pos="100000">
+                  <a:schemeClr val="bg1">
+                    <a:shade val="100000"/>
+                    <a:satMod val="115000"/>
+                  </a:schemeClr>
+                </a:gs>
+              </a:gsLst>
+              <a:lin ang="10800000" scaled="1"/>
+              <a:tileRect/>
+            </a:gradFill>
+            <a:ln>
+              <a:noFill/>
+            </a:ln>
+            <a:effectLst>
+              <a:outerShdw blurRad="88900" dist="139700" dir="5400000" sx="98000" sy="98000" algn="t" rotWithShape="0">
+                <a:prstClr val="black">
+                  <a:alpha val="40000"/>
+                </a:prstClr>
+              </a:outerShdw>
+            </a:effectLst>
+          </p:spPr>
+          <p:style>
+            <a:lnRef idx="2">
+              <a:schemeClr val="accent1">
+                <a:shade val="50000"/>
+              </a:schemeClr>
+            </a:lnRef>
+            <a:fillRef idx="1">
+              <a:schemeClr val="accent1"/>
+            </a:fillRef>
+            <a:effectRef idx="0">
+              <a:schemeClr val="accent1"/>
+            </a:effectRef>
+            <a:fontRef idx="minor">
+              <a:schemeClr val="lt1"/>
+            </a:fontRef>
+          </p:style>
+          <p:txBody>
+            <a:bodyPr rtlCol="0" anchor="ctr"/>
+            <a:lstStyle/>
+            <a:p>
+              <a:pPr algn="ctr"/>
+              <a:endParaRPr lang="ko-KR" altLang="en-US" dirty="0">
+                <a:latin typeface="나눔바른고딕" panose="020B0603020101020101" pitchFamily="50" charset="-127"/>
+                <a:ea typeface="나눔바른고딕" panose="020B0603020101020101" pitchFamily="50" charset="-127"/>
+              </a:endParaRPr>
+            </a:p>
+          </p:txBody>
+        </p:sp>
+        <p:sp>
+          <p:nvSpPr>
+            <p:cNvPr id="40" name="자유형 39"/>
+            <p:cNvSpPr/>
+            <p:nvPr/>
+          </p:nvSpPr>
+          <p:spPr>
+            <a:xfrm rot="10800000">
+              <a:off x="754421" y="2816677"/>
+              <a:ext cx="681439" cy="3343259"/>
+            </a:xfrm>
+            <a:custGeom>
+              <a:avLst/>
+              <a:gdLst>
+                <a:gd name="connsiteX0" fmla="*/ 194310 w 388620"/>
+                <a:gd name="connsiteY0" fmla="*/ 0 h 2927235"/>
+                <a:gd name="connsiteX1" fmla="*/ 388620 w 388620"/>
+                <a:gd name="connsiteY1" fmla="*/ 194310 h 2927235"/>
+                <a:gd name="connsiteX2" fmla="*/ 388620 w 388620"/>
+                <a:gd name="connsiteY2" fmla="*/ 2927235 h 2927235"/>
+                <a:gd name="connsiteX3" fmla="*/ 379599 w 388620"/>
+                <a:gd name="connsiteY3" fmla="*/ 2898175 h 2927235"/>
+                <a:gd name="connsiteX4" fmla="*/ 194310 w 388620"/>
+                <a:gd name="connsiteY4" fmla="*/ 2775357 h 2927235"/>
+                <a:gd name="connsiteX5" fmla="*/ 9021 w 388620"/>
+                <a:gd name="connsiteY5" fmla="*/ 2898175 h 2927235"/>
+                <a:gd name="connsiteX6" fmla="*/ 0 w 388620"/>
+                <a:gd name="connsiteY6" fmla="*/ 2927235 h 2927235"/>
+                <a:gd name="connsiteX7" fmla="*/ 0 w 388620"/>
+                <a:gd name="connsiteY7" fmla="*/ 194310 h 2927235"/>
+                <a:gd name="connsiteX8" fmla="*/ 194310 w 388620"/>
+                <a:gd name="connsiteY8" fmla="*/ 0 h 2927235"/>
+              </a:gdLst>
+              <a:ahLst/>
+              <a:cxnLst>
+                <a:cxn ang="0">
+                  <a:pos x="connsiteX0" y="connsiteY0"/>
+                </a:cxn>
+                <a:cxn ang="0">
+                  <a:pos x="connsiteX1" y="connsiteY1"/>
+                </a:cxn>
+                <a:cxn ang="0">
+                  <a:pos x="connsiteX2" y="connsiteY2"/>
+                </a:cxn>
+                <a:cxn ang="0">
+                  <a:pos x="connsiteX3" y="connsiteY3"/>
+                </a:cxn>
+                <a:cxn ang="0">
+                  <a:pos x="connsiteX4" y="connsiteY4"/>
+                </a:cxn>
+                <a:cxn ang="0">
+                  <a:pos x="connsiteX5" y="connsiteY5"/>
+                </a:cxn>
+                <a:cxn ang="0">
+                  <a:pos x="connsiteX6" y="connsiteY6"/>
+                </a:cxn>
+                <a:cxn ang="0">
+                  <a:pos x="connsiteX7" y="connsiteY7"/>
+                </a:cxn>
+                <a:cxn ang="0">
+                  <a:pos x="connsiteX8" y="connsiteY8"/>
+                </a:cxn>
+              </a:cxnLst>
+              <a:rect l="l" t="t" r="r" b="b"/>
+              <a:pathLst>
+                <a:path w="388620" h="2927235">
+                  <a:moveTo>
+                    <a:pt x="194310" y="0"/>
+                  </a:moveTo>
+                  <a:cubicBezTo>
+                    <a:pt x="301624" y="0"/>
+                    <a:pt x="388620" y="86996"/>
+                    <a:pt x="388620" y="194310"/>
+                  </a:cubicBezTo>
+                  <a:lnTo>
+                    <a:pt x="388620" y="2927235"/>
+                  </a:lnTo>
+                  <a:lnTo>
+                    <a:pt x="379599" y="2898175"/>
+                  </a:lnTo>
+                  <a:cubicBezTo>
+                    <a:pt x="349072" y="2826000"/>
+                    <a:pt x="277605" y="2775357"/>
+                    <a:pt x="194310" y="2775357"/>
+                  </a:cubicBezTo>
+                  <a:cubicBezTo>
+                    <a:pt x="111015" y="2775357"/>
+                    <a:pt x="39548" y="2826000"/>
+                    <a:pt x="9021" y="2898175"/>
+                  </a:cubicBezTo>
+                  <a:lnTo>
+                    <a:pt x="0" y="2927235"/>
+                  </a:lnTo>
+                  <a:lnTo>
+                    <a:pt x="0" y="194310"/>
+                  </a:lnTo>
+                  <a:cubicBezTo>
+                    <a:pt x="0" y="86996"/>
+                    <a:pt x="86996" y="0"/>
+                    <a:pt x="194310" y="0"/>
+                  </a:cubicBezTo>
+                  <a:close/>
+                </a:path>
+              </a:pathLst>
+            </a:custGeom>
+            <a:gradFill flip="none" rotWithShape="1">
+              <a:gsLst>
+                <a:gs pos="0">
+                  <a:schemeClr val="bg1">
+                    <a:shade val="67500"/>
+                    <a:satMod val="115000"/>
+                  </a:schemeClr>
+                </a:gs>
+                <a:gs pos="100000">
+                  <a:schemeClr val="bg1">
+                    <a:shade val="100000"/>
+                    <a:satMod val="115000"/>
+                  </a:schemeClr>
+                </a:gs>
+              </a:gsLst>
+              <a:lin ang="10800000" scaled="1"/>
+              <a:tileRect/>
+            </a:gradFill>
+            <a:ln>
+              <a:noFill/>
+            </a:ln>
+            <a:effectLst>
+              <a:outerShdw blurRad="88900" dist="139700" dir="5400000" sx="98000" sy="98000" algn="t" rotWithShape="0">
+                <a:prstClr val="black">
+                  <a:alpha val="40000"/>
+                </a:prstClr>
+              </a:outerShdw>
+            </a:effectLst>
+          </p:spPr>
+          <p:style>
+            <a:lnRef idx="2">
+              <a:schemeClr val="accent1">
+                <a:shade val="50000"/>
+              </a:schemeClr>
+            </a:lnRef>
+            <a:fillRef idx="1">
+              <a:schemeClr val="accent1"/>
+            </a:fillRef>
+            <a:effectRef idx="0">
+              <a:schemeClr val="accent1"/>
+            </a:effectRef>
+            <a:fontRef idx="minor">
+              <a:schemeClr val="lt1"/>
+            </a:fontRef>
+          </p:style>
+          <p:txBody>
+            <a:bodyPr rtlCol="0" anchor="ctr"/>
+            <a:lstStyle/>
+            <a:p>
+              <a:pPr algn="ctr"/>
+              <a:endParaRPr lang="ko-KR" altLang="en-US" dirty="0">
+                <a:latin typeface="나눔바른고딕" panose="020B0603020101020101" pitchFamily="50" charset="-127"/>
+                <a:ea typeface="나눔바른고딕" panose="020B0603020101020101" pitchFamily="50" charset="-127"/>
+              </a:endParaRPr>
+            </a:p>
+          </p:txBody>
+        </p:sp>
+        <p:sp>
+          <p:nvSpPr>
+            <p:cNvPr id="41" name="자유형 40"/>
+            <p:cNvSpPr/>
+            <p:nvPr/>
+          </p:nvSpPr>
+          <p:spPr>
+            <a:xfrm>
+              <a:off x="754421" y="2614644"/>
+              <a:ext cx="681439" cy="3343259"/>
+            </a:xfrm>
+            <a:custGeom>
+              <a:avLst/>
+              <a:gdLst>
+                <a:gd name="connsiteX0" fmla="*/ 194310 w 388620"/>
+                <a:gd name="connsiteY0" fmla="*/ 0 h 2927235"/>
+                <a:gd name="connsiteX1" fmla="*/ 388620 w 388620"/>
+                <a:gd name="connsiteY1" fmla="*/ 194310 h 2927235"/>
+                <a:gd name="connsiteX2" fmla="*/ 388620 w 388620"/>
+                <a:gd name="connsiteY2" fmla="*/ 2927235 h 2927235"/>
+                <a:gd name="connsiteX3" fmla="*/ 379599 w 388620"/>
+                <a:gd name="connsiteY3" fmla="*/ 2898175 h 2927235"/>
+                <a:gd name="connsiteX4" fmla="*/ 194310 w 388620"/>
+                <a:gd name="connsiteY4" fmla="*/ 2775357 h 2927235"/>
+                <a:gd name="connsiteX5" fmla="*/ 9021 w 388620"/>
+                <a:gd name="connsiteY5" fmla="*/ 2898175 h 2927235"/>
+                <a:gd name="connsiteX6" fmla="*/ 0 w 388620"/>
+                <a:gd name="connsiteY6" fmla="*/ 2927235 h 2927235"/>
+                <a:gd name="connsiteX7" fmla="*/ 0 w 388620"/>
+                <a:gd name="connsiteY7" fmla="*/ 194310 h 2927235"/>
+                <a:gd name="connsiteX8" fmla="*/ 194310 w 388620"/>
+                <a:gd name="connsiteY8" fmla="*/ 0 h 2927235"/>
+              </a:gdLst>
+              <a:ahLst/>
+              <a:cxnLst>
+                <a:cxn ang="0">
+                  <a:pos x="connsiteX0" y="connsiteY0"/>
+                </a:cxn>
+                <a:cxn ang="0">
+                  <a:pos x="connsiteX1" y="connsiteY1"/>
+                </a:cxn>
+                <a:cxn ang="0">
+                  <a:pos x="connsiteX2" y="connsiteY2"/>
+                </a:cxn>
+                <a:cxn ang="0">
+                  <a:pos x="connsiteX3" y="connsiteY3"/>
+                </a:cxn>
+                <a:cxn ang="0">
+                  <a:pos x="connsiteX4" y="connsiteY4"/>
+                </a:cxn>
+                <a:cxn ang="0">
+                  <a:pos x="connsiteX5" y="connsiteY5"/>
+                </a:cxn>
+                <a:cxn ang="0">
+                  <a:pos x="connsiteX6" y="connsiteY6"/>
+                </a:cxn>
+                <a:cxn ang="0">
+                  <a:pos x="connsiteX7" y="connsiteY7"/>
+                </a:cxn>
+                <a:cxn ang="0">
+                  <a:pos x="connsiteX8" y="connsiteY8"/>
+                </a:cxn>
+              </a:cxnLst>
+              <a:rect l="l" t="t" r="r" b="b"/>
+              <a:pathLst>
+                <a:path w="388620" h="2927235">
+                  <a:moveTo>
+                    <a:pt x="194310" y="0"/>
+                  </a:moveTo>
+                  <a:cubicBezTo>
+                    <a:pt x="301624" y="0"/>
+                    <a:pt x="388620" y="86996"/>
+                    <a:pt x="388620" y="194310"/>
+                  </a:cubicBezTo>
+                  <a:lnTo>
+                    <a:pt x="388620" y="2927235"/>
+                  </a:lnTo>
+                  <a:lnTo>
+                    <a:pt x="379599" y="2898175"/>
+                  </a:lnTo>
+                  <a:cubicBezTo>
+                    <a:pt x="349072" y="2826000"/>
+                    <a:pt x="277605" y="2775357"/>
+                    <a:pt x="194310" y="2775357"/>
+                  </a:cubicBezTo>
+                  <a:cubicBezTo>
+                    <a:pt x="111015" y="2775357"/>
+                    <a:pt x="39548" y="2826000"/>
+                    <a:pt x="9021" y="2898175"/>
+                  </a:cubicBezTo>
+                  <a:lnTo>
+                    <a:pt x="0" y="2927235"/>
+                  </a:lnTo>
+                  <a:lnTo>
+                    <a:pt x="0" y="194310"/>
+                  </a:lnTo>
+                  <a:cubicBezTo>
+                    <a:pt x="0" y="86996"/>
+                    <a:pt x="86996" y="0"/>
+                    <a:pt x="194310" y="0"/>
+                  </a:cubicBezTo>
+                  <a:close/>
+                </a:path>
+              </a:pathLst>
+            </a:custGeom>
+            <a:gradFill flip="none" rotWithShape="1">
+              <a:gsLst>
+                <a:gs pos="0">
+                  <a:schemeClr val="bg1">
+                    <a:shade val="67500"/>
+                    <a:satMod val="115000"/>
+                  </a:schemeClr>
+                </a:gs>
+                <a:gs pos="100000">
+                  <a:schemeClr val="bg1">
+                    <a:shade val="100000"/>
+                    <a:satMod val="115000"/>
+                  </a:schemeClr>
+                </a:gs>
+              </a:gsLst>
+              <a:lin ang="10800000" scaled="1"/>
+              <a:tileRect/>
+            </a:gradFill>
+            <a:ln>
+              <a:noFill/>
+            </a:ln>
+            <a:effectLst>
+              <a:outerShdw blurRad="88900" dist="139700" dir="5400000" sx="98000" sy="98000" algn="t" rotWithShape="0">
+                <a:prstClr val="black">
+                  <a:alpha val="40000"/>
+                </a:prstClr>
+              </a:outerShdw>
+            </a:effectLst>
+          </p:spPr>
+          <p:style>
+            <a:lnRef idx="2">
+              <a:schemeClr val="accent1">
+                <a:shade val="50000"/>
+              </a:schemeClr>
+            </a:lnRef>
+            <a:fillRef idx="1">
+              <a:schemeClr val="accent1"/>
+            </a:fillRef>
+            <a:effectRef idx="0">
+              <a:schemeClr val="accent1"/>
+            </a:effectRef>
+            <a:fontRef idx="minor">
+              <a:schemeClr val="lt1"/>
+            </a:fontRef>
+          </p:style>
+          <p:txBody>
+            <a:bodyPr rtlCol="0" anchor="ctr"/>
+            <a:lstStyle/>
+            <a:p>
+              <a:pPr algn="ctr"/>
+              <a:endParaRPr lang="ko-KR" altLang="en-US" dirty="0">
+                <a:latin typeface="나눔바른고딕" panose="020B0603020101020101" pitchFamily="50" charset="-127"/>
+                <a:ea typeface="나눔바른고딕" panose="020B0603020101020101" pitchFamily="50" charset="-127"/>
+              </a:endParaRPr>
+            </a:p>
+          </p:txBody>
+        </p:sp>
+        <p:sp>
+          <p:nvSpPr>
+            <p:cNvPr id="42" name="자유형 41"/>
+            <p:cNvSpPr/>
+            <p:nvPr/>
+          </p:nvSpPr>
+          <p:spPr>
+            <a:xfrm>
+              <a:off x="586490" y="739768"/>
+              <a:ext cx="1017302" cy="4991063"/>
+            </a:xfrm>
+            <a:custGeom>
+              <a:avLst/>
+              <a:gdLst>
+                <a:gd name="connsiteX0" fmla="*/ 194310 w 388620"/>
+                <a:gd name="connsiteY0" fmla="*/ 0 h 2927235"/>
+                <a:gd name="connsiteX1" fmla="*/ 388620 w 388620"/>
+                <a:gd name="connsiteY1" fmla="*/ 194310 h 2927235"/>
+                <a:gd name="connsiteX2" fmla="*/ 388620 w 388620"/>
+                <a:gd name="connsiteY2" fmla="*/ 2927235 h 2927235"/>
+                <a:gd name="connsiteX3" fmla="*/ 379599 w 388620"/>
+                <a:gd name="connsiteY3" fmla="*/ 2898175 h 2927235"/>
+                <a:gd name="connsiteX4" fmla="*/ 194310 w 388620"/>
+                <a:gd name="connsiteY4" fmla="*/ 2775357 h 2927235"/>
+                <a:gd name="connsiteX5" fmla="*/ 9021 w 388620"/>
+                <a:gd name="connsiteY5" fmla="*/ 2898175 h 2927235"/>
+                <a:gd name="connsiteX6" fmla="*/ 0 w 388620"/>
+                <a:gd name="connsiteY6" fmla="*/ 2927235 h 2927235"/>
+                <a:gd name="connsiteX7" fmla="*/ 0 w 388620"/>
+                <a:gd name="connsiteY7" fmla="*/ 194310 h 2927235"/>
+                <a:gd name="connsiteX8" fmla="*/ 194310 w 388620"/>
+                <a:gd name="connsiteY8" fmla="*/ 0 h 2927235"/>
+              </a:gdLst>
+              <a:ahLst/>
+              <a:cxnLst>
+                <a:cxn ang="0">
+                  <a:pos x="connsiteX0" y="connsiteY0"/>
+                </a:cxn>
+                <a:cxn ang="0">
+                  <a:pos x="connsiteX1" y="connsiteY1"/>
+                </a:cxn>
+                <a:cxn ang="0">
+                  <a:pos x="connsiteX2" y="connsiteY2"/>
+                </a:cxn>
+                <a:cxn ang="0">
+                  <a:pos x="connsiteX3" y="connsiteY3"/>
+                </a:cxn>
+                <a:cxn ang="0">
+                  <a:pos x="connsiteX4" y="connsiteY4"/>
+                </a:cxn>
+                <a:cxn ang="0">
+                  <a:pos x="connsiteX5" y="connsiteY5"/>
+                </a:cxn>
+                <a:cxn ang="0">
+                  <a:pos x="connsiteX6" y="connsiteY6"/>
+                </a:cxn>
+                <a:cxn ang="0">
+                  <a:pos x="connsiteX7" y="connsiteY7"/>
+                </a:cxn>
+                <a:cxn ang="0">
+                  <a:pos x="connsiteX8" y="connsiteY8"/>
+                </a:cxn>
+              </a:cxnLst>
+              <a:rect l="l" t="t" r="r" b="b"/>
+              <a:pathLst>
+                <a:path w="388620" h="2927235">
+                  <a:moveTo>
+                    <a:pt x="194310" y="0"/>
+                  </a:moveTo>
+                  <a:cubicBezTo>
+                    <a:pt x="301624" y="0"/>
+                    <a:pt x="388620" y="86996"/>
+                    <a:pt x="388620" y="194310"/>
+                  </a:cubicBezTo>
+                  <a:lnTo>
+                    <a:pt x="388620" y="2927235"/>
+                  </a:lnTo>
+                  <a:lnTo>
+                    <a:pt x="379599" y="2898175"/>
+                  </a:lnTo>
+                  <a:cubicBezTo>
+                    <a:pt x="349072" y="2826000"/>
+                    <a:pt x="277605" y="2775357"/>
+                    <a:pt x="194310" y="2775357"/>
+                  </a:cubicBezTo>
+                  <a:cubicBezTo>
+                    <a:pt x="111015" y="2775357"/>
+                    <a:pt x="39548" y="2826000"/>
+                    <a:pt x="9021" y="2898175"/>
+                  </a:cubicBezTo>
+                  <a:lnTo>
+                    <a:pt x="0" y="2927235"/>
+                  </a:lnTo>
+                  <a:lnTo>
+                    <a:pt x="0" y="194310"/>
+                  </a:lnTo>
+                  <a:cubicBezTo>
+                    <a:pt x="0" y="86996"/>
+                    <a:pt x="86996" y="0"/>
+                    <a:pt x="194310" y="0"/>
+                  </a:cubicBezTo>
+                  <a:close/>
+                </a:path>
+              </a:pathLst>
+            </a:custGeom>
+            <a:gradFill flip="none" rotWithShape="1">
+              <a:gsLst>
+                <a:gs pos="0">
+                  <a:schemeClr val="bg1">
+                    <a:shade val="67500"/>
+                    <a:satMod val="115000"/>
+                  </a:schemeClr>
+                </a:gs>
+                <a:gs pos="100000">
+                  <a:schemeClr val="bg1">
+                    <a:shade val="100000"/>
+                    <a:satMod val="115000"/>
+                  </a:schemeClr>
+                </a:gs>
+              </a:gsLst>
+              <a:lin ang="10800000" scaled="1"/>
+              <a:tileRect/>
+            </a:gradFill>
+            <a:ln>
+              <a:noFill/>
+            </a:ln>
+            <a:effectLst>
+              <a:outerShdw blurRad="88900" dist="139700" dir="5400000" sx="98000" sy="98000" algn="t" rotWithShape="0">
+                <a:prstClr val="black">
+                  <a:alpha val="40000"/>
+                </a:prstClr>
+              </a:outerShdw>
+            </a:effectLst>
+          </p:spPr>
+          <p:style>
+            <a:lnRef idx="2">
+              <a:schemeClr val="accent1">
+                <a:shade val="50000"/>
+              </a:schemeClr>
+            </a:lnRef>
+            <a:fillRef idx="1">
+              <a:schemeClr val="accent1"/>
+            </a:fillRef>
+            <a:effectRef idx="0">
+              <a:schemeClr val="accent1"/>
+            </a:effectRef>
+            <a:fontRef idx="minor">
+              <a:schemeClr val="lt1"/>
+            </a:fontRef>
+          </p:style>
+          <p:txBody>
+            <a:bodyPr rtlCol="0" anchor="ctr"/>
+            <a:lstStyle/>
+            <a:p>
+              <a:pPr algn="ctr"/>
+              <a:endParaRPr lang="ko-KR" altLang="en-US" dirty="0">
+                <a:latin typeface="나눔바른고딕" panose="020B0603020101020101" pitchFamily="50" charset="-127"/>
+                <a:ea typeface="나눔바른고딕" panose="020B0603020101020101" pitchFamily="50" charset="-127"/>
+              </a:endParaRPr>
+            </a:p>
+          </p:txBody>
+        </p:sp>
+      </p:grpSp>
+      <p:graphicFrame>
+        <p:nvGraphicFramePr>
+          <p:cNvPr id="4" name="표 3"/>
+          <p:cNvGraphicFramePr>
+            <a:graphicFrameLocks noGrp="1"/>
+          </p:cNvGraphicFramePr>
+          <p:nvPr>
+            <p:extLst>
+              <p:ext uri="{D42A27DB-BD31-4B8C-83A1-F6EECF244321}">
+                <p14:modId xmlns:p14="http://schemas.microsoft.com/office/powerpoint/2010/main" val="641727846"/>
+              </p:ext>
+            </p:extLst>
+          </p:nvPr>
+        </p:nvGraphicFramePr>
+        <p:xfrm>
+          <a:off x="9168341" y="1433634"/>
+          <a:ext cx="2688299" cy="915066"/>
+        </p:xfrm>
+        <a:graphic>
+          <a:graphicData uri="http://schemas.openxmlformats.org/drawingml/2006/table">
+            <a:tbl>
+              <a:tblPr firstRow="1" bandRow="1"/>
+              <a:tblGrid>
+                <a:gridCol w="2688299">
+                  <a:extLst>
+                    <a:ext uri="{9D8B030D-6E8A-4147-A177-3AD203B41FA5}">
+                      <a16:colId xmlns:a16="http://schemas.microsoft.com/office/drawing/2014/main" xmlns="" val="20000"/>
+                    </a:ext>
+                  </a:extLst>
+                </a:gridCol>
+              </a:tblGrid>
+              <a:tr h="424495">
+                <a:tc>
+                  <a:txBody>
+                    <a:bodyPr/>
+                    <a:lstStyle/>
+                    <a:p>
+                      <a:pPr algn="ctr" latinLnBrk="1"/>
+                      <a:r>
+                        <a:rPr lang="ko-KR" altLang="en-US" sz="1200" b="1" dirty="0">
+                          <a:solidFill>
+                            <a:schemeClr val="tx1"/>
+                          </a:solidFill>
+                          <a:latin typeface="나눔바른고딕" panose="020B0603020101020101" pitchFamily="50" charset="-127"/>
+                          <a:ea typeface="나눔바른고딕" panose="020B0603020101020101" pitchFamily="50" charset="-127"/>
+                        </a:rPr>
+                        <a:t>화면코드</a:t>
+                      </a:r>
+                    </a:p>
+                  </a:txBody>
+                  <a:tcPr marL="121920" marR="121920" marT="60960" marB="60960" anchor="ctr">
+                    <a:solidFill>
+                      <a:srgbClr val="FF9E00"/>
+                    </a:solidFill>
+                  </a:tcPr>
+                </a:tc>
+                <a:extLst>
+                  <a:ext uri="{0D108BD9-81ED-4DB2-BD59-A6C34878D82A}">
+                    <a16:rowId xmlns:a16="http://schemas.microsoft.com/office/drawing/2014/main" xmlns="" val="10000"/>
+                  </a:ext>
+                </a:extLst>
+              </a:tr>
+              <a:tr h="490571">
+                <a:tc>
+                  <a:txBody>
+                    <a:bodyPr/>
+                    <a:lstStyle/>
+                    <a:p>
+                      <a:pPr algn="ctr" latinLnBrk="1"/>
+                      <a:r>
+                        <a:rPr lang="en-US" altLang="ko-KR" sz="1500" dirty="0" err="1">
+                          <a:latin typeface="나눔바른고딕" panose="020B0603020101020101" pitchFamily="50" charset="-127"/>
+                          <a:ea typeface="나눔바른고딕" panose="020B0603020101020101" pitchFamily="50" charset="-127"/>
+                        </a:rPr>
+                        <a:t>sh_user_m_myPage</a:t>
+                      </a:r>
+                      <a:endParaRPr lang="ko-KR" altLang="en-US" sz="1500" dirty="0">
+                        <a:latin typeface="나눔바른고딕" panose="020B0603020101020101" pitchFamily="50" charset="-127"/>
+                        <a:ea typeface="나눔바른고딕" panose="020B0603020101020101" pitchFamily="50" charset="-127"/>
+                      </a:endParaRPr>
+                    </a:p>
+                  </a:txBody>
+                  <a:tcPr marL="121920" marR="121920" marT="60960" marB="60960" anchor="ctr"/>
+                </a:tc>
+                <a:extLst>
+                  <a:ext uri="{0D108BD9-81ED-4DB2-BD59-A6C34878D82A}">
+                    <a16:rowId xmlns:a16="http://schemas.microsoft.com/office/drawing/2014/main" xmlns="" val="10001"/>
+                  </a:ext>
+                </a:extLst>
+              </a:tr>
+            </a:tbl>
+          </a:graphicData>
+        </a:graphic>
+      </p:graphicFrame>
+      <p:graphicFrame>
+        <p:nvGraphicFramePr>
+          <p:cNvPr id="6" name="표 5"/>
+          <p:cNvGraphicFramePr>
+            <a:graphicFrameLocks noGrp="1"/>
+          </p:cNvGraphicFramePr>
+          <p:nvPr>
+            <p:extLst>
+              <p:ext uri="{D42A27DB-BD31-4B8C-83A1-F6EECF244321}">
+                <p14:modId xmlns:p14="http://schemas.microsoft.com/office/powerpoint/2010/main" val="1580124280"/>
+              </p:ext>
+            </p:extLst>
+          </p:nvPr>
+        </p:nvGraphicFramePr>
+        <p:xfrm>
+          <a:off x="9168341" y="2479152"/>
+          <a:ext cx="2688299" cy="3137837"/>
+        </p:xfrm>
+        <a:graphic>
+          <a:graphicData uri="http://schemas.openxmlformats.org/drawingml/2006/table">
+            <a:tbl>
+              <a:tblPr firstRow="1" bandRow="1"/>
+              <a:tblGrid>
+                <a:gridCol w="280507">
+                  <a:extLst>
+                    <a:ext uri="{9D8B030D-6E8A-4147-A177-3AD203B41FA5}">
+                      <a16:colId xmlns:a16="http://schemas.microsoft.com/office/drawing/2014/main" xmlns="" val="20000"/>
+                    </a:ext>
+                  </a:extLst>
+                </a:gridCol>
+                <a:gridCol w="2407792">
+                  <a:extLst>
+                    <a:ext uri="{9D8B030D-6E8A-4147-A177-3AD203B41FA5}">
+                      <a16:colId xmlns:a16="http://schemas.microsoft.com/office/drawing/2014/main" xmlns="" val="20001"/>
+                    </a:ext>
+                  </a:extLst>
+                </a:gridCol>
+              </a:tblGrid>
+              <a:tr h="469796">
+                <a:tc>
+                  <a:txBody>
+                    <a:bodyPr/>
+                    <a:lstStyle/>
+                    <a:p>
+                      <a:pPr algn="ctr" latinLnBrk="1">
+                        <a:lnSpc>
+                          <a:spcPts val="1800"/>
+                        </a:lnSpc>
+                      </a:pPr>
+                      <a:r>
+                        <a:rPr lang="en-US" altLang="ko-KR" sz="1200" b="1" dirty="0">
+                          <a:latin typeface="나눔바른고딕" panose="020B0603020101020101" pitchFamily="50" charset="-127"/>
+                          <a:ea typeface="나눔바른고딕" panose="020B0603020101020101" pitchFamily="50" charset="-127"/>
+                        </a:rPr>
+                        <a:t>#</a:t>
+                      </a:r>
+                      <a:endParaRPr lang="ko-KR" altLang="en-US" sz="1200" b="1" dirty="0">
+                        <a:latin typeface="나눔바른고딕" panose="020B0603020101020101" pitchFamily="50" charset="-127"/>
+                        <a:ea typeface="나눔바른고딕" panose="020B0603020101020101" pitchFamily="50" charset="-127"/>
+                      </a:endParaRPr>
+                    </a:p>
+                  </a:txBody>
+                  <a:tcPr marL="121920" marR="121920" marT="60960" marB="60960" anchor="ctr">
+                    <a:solidFill>
+                      <a:srgbClr val="FF9E00"/>
+                    </a:solidFill>
+                  </a:tcPr>
+                </a:tc>
+                <a:tc>
+                  <a:txBody>
+                    <a:bodyPr/>
+                    <a:lstStyle/>
+                    <a:p>
+                      <a:pPr algn="ctr" latinLnBrk="1">
+                        <a:lnSpc>
+                          <a:spcPts val="1800"/>
+                        </a:lnSpc>
+                      </a:pPr>
+                      <a:r>
+                        <a:rPr lang="ko-KR" altLang="en-US" sz="1200" b="1" dirty="0">
+                          <a:latin typeface="나눔바른고딕" panose="020B0603020101020101" pitchFamily="50" charset="-127"/>
+                          <a:ea typeface="나눔바른고딕" panose="020B0603020101020101" pitchFamily="50" charset="-127"/>
+                        </a:rPr>
+                        <a:t>기능</a:t>
+                      </a:r>
+                    </a:p>
+                  </a:txBody>
+                  <a:tcPr marL="121920" marR="121920" marT="60960" marB="60960" anchor="ctr">
+                    <a:solidFill>
+                      <a:srgbClr val="FF9E00"/>
+                    </a:solidFill>
+                  </a:tcPr>
+                </a:tc>
+                <a:extLst>
+                  <a:ext uri="{0D108BD9-81ED-4DB2-BD59-A6C34878D82A}">
+                    <a16:rowId xmlns:a16="http://schemas.microsoft.com/office/drawing/2014/main" xmlns="" val="10000"/>
+                  </a:ext>
+                </a:extLst>
+              </a:tr>
+              <a:tr h="620107">
+                <a:tc>
+                  <a:txBody>
+                    <a:bodyPr/>
+                    <a:lstStyle/>
+                    <a:p>
+                      <a:pPr algn="ctr" latinLnBrk="1">
+                        <a:lnSpc>
+                          <a:spcPts val="1800"/>
+                        </a:lnSpc>
+                      </a:pPr>
+                      <a:r>
+                        <a:rPr lang="en-US" altLang="ko-KR" sz="1300" dirty="0">
+                          <a:latin typeface="나눔바른고딕" panose="020B0603020101020101" pitchFamily="50" charset="-127"/>
+                          <a:ea typeface="나눔바른고딕" panose="020B0603020101020101" pitchFamily="50" charset="-127"/>
+                        </a:rPr>
+                        <a:t>1</a:t>
+                      </a:r>
+                      <a:endParaRPr lang="ko-KR" altLang="en-US" sz="1300" dirty="0">
+                        <a:latin typeface="나눔바른고딕" panose="020B0603020101020101" pitchFamily="50" charset="-127"/>
+                        <a:ea typeface="나눔바른고딕" panose="020B0603020101020101" pitchFamily="50" charset="-127"/>
+                      </a:endParaRPr>
+                    </a:p>
+                  </a:txBody>
+                  <a:tcPr marL="121920" marR="121920" marT="60960" marB="60960" anchor="ctr"/>
+                </a:tc>
+                <a:tc>
+                  <a:txBody>
+                    <a:bodyPr/>
+                    <a:lstStyle/>
+                    <a:p>
+                      <a:pPr algn="l" latinLnBrk="1">
+                        <a:lnSpc>
+                          <a:spcPts val="1800"/>
+                        </a:lnSpc>
+                      </a:pPr>
+                      <a:r>
+                        <a:rPr lang="ko-KR" altLang="en-US" sz="1200" b="1" dirty="0" err="1">
+                          <a:latin typeface="나눔바른고딕" panose="020B0603020101020101" pitchFamily="50" charset="-127"/>
+                          <a:ea typeface="나눔바른고딕" panose="020B0603020101020101" pitchFamily="50" charset="-127"/>
+                        </a:rPr>
+                        <a:t>펀딩</a:t>
+                      </a:r>
+                      <a:r>
+                        <a:rPr lang="en-US" altLang="ko-KR" sz="1200" b="1" dirty="0">
+                          <a:latin typeface="나눔바른고딕" panose="020B0603020101020101" pitchFamily="50" charset="-127"/>
+                          <a:ea typeface="나눔바른고딕" panose="020B0603020101020101" pitchFamily="50" charset="-127"/>
+                        </a:rPr>
+                        <a:t>/</a:t>
+                      </a:r>
+                      <a:r>
+                        <a:rPr lang="ko-KR" altLang="en-US" sz="1200" b="1" dirty="0">
+                          <a:latin typeface="나눔바른고딕" panose="020B0603020101020101" pitchFamily="50" charset="-127"/>
+                          <a:ea typeface="나눔바른고딕" panose="020B0603020101020101" pitchFamily="50" charset="-127"/>
+                        </a:rPr>
+                        <a:t>주문 횟수</a:t>
+                      </a:r>
+                      <a:endParaRPr lang="en-US" altLang="ko-KR" sz="1200" b="1" dirty="0">
+                        <a:latin typeface="나눔바른고딕" panose="020B0603020101020101" pitchFamily="50" charset="-127"/>
+                        <a:ea typeface="나눔바른고딕" panose="020B0603020101020101" pitchFamily="50" charset="-127"/>
+                      </a:endParaRPr>
+                    </a:p>
+                    <a:p>
+                      <a:pPr algn="l" latinLnBrk="1">
+                        <a:lnSpc>
+                          <a:spcPts val="1800"/>
+                        </a:lnSpc>
+                      </a:pPr>
+                      <a:r>
+                        <a:rPr lang="en-US" altLang="ko-KR" sz="1200" dirty="0">
+                          <a:latin typeface="나눔바른고딕" panose="020B0603020101020101" pitchFamily="50" charset="-127"/>
+                          <a:ea typeface="나눔바른고딕" panose="020B0603020101020101" pitchFamily="50" charset="-127"/>
+                        </a:rPr>
+                        <a:t>- </a:t>
+                      </a:r>
+                      <a:r>
+                        <a:rPr lang="ko-KR" altLang="en-US" sz="1200" dirty="0">
+                          <a:latin typeface="나눔바른고딕" panose="020B0603020101020101" pitchFamily="50" charset="-127"/>
+                          <a:ea typeface="나눔바른고딕" panose="020B0603020101020101" pitchFamily="50" charset="-127"/>
+                        </a:rPr>
+                        <a:t>최초 가입이래 총 횟수 표시</a:t>
+                      </a:r>
+                    </a:p>
+                  </a:txBody>
+                  <a:tcPr marL="121920" marR="121920" marT="60960" marB="60960"/>
+                </a:tc>
+                <a:extLst>
+                  <a:ext uri="{0D108BD9-81ED-4DB2-BD59-A6C34878D82A}">
+                    <a16:rowId xmlns:a16="http://schemas.microsoft.com/office/drawing/2014/main" xmlns="" val="10001"/>
+                  </a:ext>
+                </a:extLst>
+              </a:tr>
+              <a:tr h="620107">
+                <a:tc>
+                  <a:txBody>
+                    <a:bodyPr/>
+                    <a:lstStyle/>
+                    <a:p>
+                      <a:pPr algn="ctr" latinLnBrk="1">
+                        <a:lnSpc>
+                          <a:spcPts val="1800"/>
+                        </a:lnSpc>
+                      </a:pPr>
+                      <a:r>
+                        <a:rPr lang="en-US" altLang="ko-KR" sz="1300" dirty="0">
+                          <a:latin typeface="나눔바른고딕" panose="020B0603020101020101" pitchFamily="50" charset="-127"/>
+                          <a:ea typeface="나눔바른고딕" panose="020B0603020101020101" pitchFamily="50" charset="-127"/>
+                        </a:rPr>
+                        <a:t>2</a:t>
+                      </a:r>
+                      <a:endParaRPr lang="ko-KR" altLang="en-US" sz="1300" dirty="0">
+                        <a:latin typeface="나눔바른고딕" panose="020B0603020101020101" pitchFamily="50" charset="-127"/>
+                        <a:ea typeface="나눔바른고딕" panose="020B0603020101020101" pitchFamily="50" charset="-127"/>
+                      </a:endParaRPr>
+                    </a:p>
+                  </a:txBody>
+                  <a:tcPr marL="121920" marR="121920" marT="60960" marB="60960" anchor="ctr"/>
+                </a:tc>
+                <a:tc>
+                  <a:txBody>
+                    <a:bodyPr/>
+                    <a:lstStyle/>
+                    <a:p>
+                      <a:pPr algn="l" latinLnBrk="1">
+                        <a:lnSpc>
+                          <a:spcPts val="1800"/>
+                        </a:lnSpc>
+                      </a:pPr>
+                      <a:r>
+                        <a:rPr lang="ko-KR" altLang="en-US" sz="1200" b="1" i="0" u="none" strike="noStrike" cap="none" dirty="0">
+                          <a:solidFill>
+                            <a:srgbClr val="000000"/>
+                          </a:solidFill>
+                          <a:latin typeface="나눔바른고딕" panose="020B0603020101020101" pitchFamily="50" charset="-127"/>
+                          <a:ea typeface="나눔바른고딕" panose="020B0603020101020101" pitchFamily="50" charset="-127"/>
+                          <a:cs typeface="Arial" panose="020B0604020202020204" pitchFamily="34" charset="0"/>
+                          <a:sym typeface="Arial"/>
+                        </a:rPr>
+                        <a:t>프로필 이미지</a:t>
+                      </a:r>
+                      <a:endParaRPr lang="en-US" altLang="ko-KR" sz="1200" b="1" i="0" u="none" strike="noStrike" cap="none" dirty="0">
+                        <a:solidFill>
+                          <a:srgbClr val="000000"/>
+                        </a:solidFill>
+                        <a:latin typeface="나눔바른고딕" panose="020B0603020101020101" pitchFamily="50" charset="-127"/>
+                        <a:ea typeface="나눔바른고딕" panose="020B0603020101020101" pitchFamily="50" charset="-127"/>
+                        <a:cs typeface="Arial" panose="020B0604020202020204" pitchFamily="34" charset="0"/>
+                        <a:sym typeface="Arial"/>
+                      </a:endParaRPr>
+                    </a:p>
+                    <a:p>
+                      <a:pPr algn="l" latinLnBrk="1">
+                        <a:lnSpc>
+                          <a:spcPts val="1800"/>
+                        </a:lnSpc>
+                      </a:pPr>
+                      <a:r>
+                        <a:rPr lang="en-US" altLang="ko-KR" sz="1200" b="0" i="0" u="none" strike="noStrike" cap="none" dirty="0">
+                          <a:solidFill>
+                            <a:srgbClr val="000000"/>
+                          </a:solidFill>
+                          <a:latin typeface="나눔바른고딕" panose="020B0603020101020101" pitchFamily="50" charset="-127"/>
+                          <a:ea typeface="나눔바른고딕" panose="020B0603020101020101" pitchFamily="50" charset="-127"/>
+                          <a:cs typeface="Arial" panose="020B0604020202020204" pitchFamily="34" charset="0"/>
+                          <a:sym typeface="Arial"/>
+                        </a:rPr>
+                        <a:t>- </a:t>
+                      </a:r>
+                      <a:r>
+                        <a:rPr lang="ko-KR" altLang="en-US" sz="1200" b="0" i="0" u="none" strike="noStrike" cap="none" dirty="0" err="1">
+                          <a:solidFill>
+                            <a:srgbClr val="000000"/>
+                          </a:solidFill>
+                          <a:latin typeface="나눔바른고딕" panose="020B0603020101020101" pitchFamily="50" charset="-127"/>
+                          <a:ea typeface="나눔바른고딕" panose="020B0603020101020101" pitchFamily="50" charset="-127"/>
+                          <a:cs typeface="Arial" panose="020B0604020202020204" pitchFamily="34" charset="0"/>
+                          <a:sym typeface="Arial"/>
+                        </a:rPr>
+                        <a:t>클릭시</a:t>
+                      </a:r>
+                      <a:r>
+                        <a:rPr lang="ko-KR" altLang="en-US" sz="1200" b="0" i="0" u="none" strike="noStrike" cap="none" dirty="0">
+                          <a:solidFill>
+                            <a:srgbClr val="000000"/>
+                          </a:solidFill>
+                          <a:latin typeface="나눔바른고딕" panose="020B0603020101020101" pitchFamily="50" charset="-127"/>
+                          <a:ea typeface="나눔바른고딕" panose="020B0603020101020101" pitchFamily="50" charset="-127"/>
+                          <a:cs typeface="Arial" panose="020B0604020202020204" pitchFamily="34" charset="0"/>
+                          <a:sym typeface="Arial"/>
+                        </a:rPr>
+                        <a:t> 수정 가능</a:t>
+                      </a:r>
+                    </a:p>
+                  </a:txBody>
+                  <a:tcPr marL="121920" marR="121920" marT="60960" marB="60960"/>
+                </a:tc>
+                <a:extLst>
+                  <a:ext uri="{0D108BD9-81ED-4DB2-BD59-A6C34878D82A}">
+                    <a16:rowId xmlns:a16="http://schemas.microsoft.com/office/drawing/2014/main" xmlns="" val="10002"/>
+                  </a:ext>
+                </a:extLst>
+              </a:tr>
+              <a:tr h="620107">
+                <a:tc>
+                  <a:txBody>
+                    <a:bodyPr/>
+                    <a:lstStyle/>
+                    <a:p>
+                      <a:pPr algn="ctr" latinLnBrk="1">
+                        <a:lnSpc>
+                          <a:spcPts val="1800"/>
+                        </a:lnSpc>
+                      </a:pPr>
+                      <a:r>
+                        <a:rPr lang="en-US" altLang="ko-KR" sz="1300" dirty="0">
+                          <a:latin typeface="나눔바른고딕" panose="020B0603020101020101" pitchFamily="50" charset="-127"/>
+                          <a:ea typeface="나눔바른고딕" panose="020B0603020101020101" pitchFamily="50" charset="-127"/>
+                        </a:rPr>
+                        <a:t>3</a:t>
+                      </a:r>
+                      <a:endParaRPr lang="ko-KR" altLang="en-US" sz="1300" dirty="0">
+                        <a:latin typeface="나눔바른고딕" panose="020B0603020101020101" pitchFamily="50" charset="-127"/>
+                        <a:ea typeface="나눔바른고딕" panose="020B0603020101020101" pitchFamily="50" charset="-127"/>
+                      </a:endParaRPr>
+                    </a:p>
+                  </a:txBody>
+                  <a:tcPr marL="121920" marR="121920" marT="60960" marB="60960" anchor="ctr"/>
+                </a:tc>
+                <a:tc>
+                  <a:txBody>
+                    <a:bodyPr/>
+                    <a:lstStyle/>
+                    <a:p>
+                      <a:pPr algn="l" latinLnBrk="1">
+                        <a:lnSpc>
+                          <a:spcPts val="1800"/>
+                        </a:lnSpc>
+                      </a:pPr>
+                      <a:r>
+                        <a:rPr lang="ko-KR" altLang="en-US" sz="1200" b="1" i="0" u="none" strike="noStrike" kern="1200" cap="none" dirty="0">
+                          <a:solidFill>
+                            <a:srgbClr val="000000"/>
+                          </a:solidFill>
+                          <a:latin typeface="나눔바른고딕" panose="020B0603020101020101" pitchFamily="50" charset="-127"/>
+                          <a:ea typeface="나눔바른고딕" panose="020B0603020101020101" pitchFamily="50" charset="-127"/>
+                          <a:cs typeface="Arial" panose="020B0604020202020204" pitchFamily="34" charset="0"/>
+                          <a:sym typeface="Arial"/>
+                        </a:rPr>
+                        <a:t>프로필 편집 </a:t>
+                      </a:r>
+                      <a:r>
+                        <a:rPr lang="en-US" altLang="ko-KR" sz="1200" b="1" i="0" u="none" strike="noStrike" kern="1200" cap="none" dirty="0">
+                          <a:solidFill>
+                            <a:srgbClr val="000000"/>
+                          </a:solidFill>
+                          <a:latin typeface="나눔바른고딕" panose="020B0603020101020101" pitchFamily="50" charset="-127"/>
+                          <a:ea typeface="나눔바른고딕" panose="020B0603020101020101" pitchFamily="50" charset="-127"/>
+                          <a:cs typeface="Arial" panose="020B0604020202020204" pitchFamily="34" charset="0"/>
+                          <a:sym typeface="Arial"/>
+                        </a:rPr>
+                        <a:t>(</a:t>
+                      </a:r>
+                      <a:r>
+                        <a:rPr lang="ko-KR" altLang="en-US" sz="1200" b="1" i="0" u="none" strike="noStrike" kern="1200" cap="none" dirty="0">
+                          <a:solidFill>
+                            <a:srgbClr val="000000"/>
+                          </a:solidFill>
+                          <a:latin typeface="나눔바른고딕" panose="020B0603020101020101" pitchFamily="50" charset="-127"/>
+                          <a:ea typeface="나눔바른고딕" panose="020B0603020101020101" pitchFamily="50" charset="-127"/>
+                          <a:cs typeface="Arial" panose="020B0604020202020204" pitchFamily="34" charset="0"/>
+                          <a:sym typeface="Arial"/>
+                        </a:rPr>
+                        <a:t>버튼</a:t>
+                      </a:r>
+                      <a:r>
+                        <a:rPr lang="en-US" altLang="ko-KR" sz="1200" b="1" i="0" u="none" strike="noStrike" kern="1200" cap="none" dirty="0">
+                          <a:solidFill>
+                            <a:srgbClr val="000000"/>
+                          </a:solidFill>
+                          <a:latin typeface="나눔바른고딕" panose="020B0603020101020101" pitchFamily="50" charset="-127"/>
+                          <a:ea typeface="나눔바른고딕" panose="020B0603020101020101" pitchFamily="50" charset="-127"/>
+                          <a:cs typeface="Arial" panose="020B0604020202020204" pitchFamily="34" charset="0"/>
+                          <a:sym typeface="Arial"/>
+                        </a:rPr>
+                        <a:t>)</a:t>
+                      </a:r>
+                    </a:p>
+                    <a:p>
+                      <a:pPr algn="l" latinLnBrk="1">
+                        <a:lnSpc>
+                          <a:spcPts val="1800"/>
+                        </a:lnSpc>
+                      </a:pPr>
+                      <a:r>
+                        <a:rPr lang="en-US" altLang="ko-KR" sz="1200" b="0" i="0" u="none" strike="noStrike" kern="1200" cap="none" dirty="0">
+                          <a:solidFill>
+                            <a:srgbClr val="000000"/>
+                          </a:solidFill>
+                          <a:latin typeface="나눔바른고딕" panose="020B0603020101020101" pitchFamily="50" charset="-127"/>
+                          <a:ea typeface="나눔바른고딕" panose="020B0603020101020101" pitchFamily="50" charset="-127"/>
+                          <a:cs typeface="Arial" panose="020B0604020202020204" pitchFamily="34" charset="0"/>
+                          <a:sym typeface="Arial"/>
+                        </a:rPr>
+                        <a:t>- </a:t>
+                      </a:r>
+                      <a:r>
+                        <a:rPr lang="ko-KR" altLang="en-US" sz="1200" b="0" i="0" u="none" strike="noStrike" kern="1200" cap="none" dirty="0">
+                          <a:solidFill>
+                            <a:srgbClr val="000000"/>
+                          </a:solidFill>
+                          <a:latin typeface="나눔바른고딕" panose="020B0603020101020101" pitchFamily="50" charset="-127"/>
+                          <a:ea typeface="나눔바른고딕" panose="020B0603020101020101" pitchFamily="50" charset="-127"/>
+                          <a:cs typeface="Arial" panose="020B0604020202020204" pitchFamily="34" charset="0"/>
+                          <a:sym typeface="Arial"/>
+                        </a:rPr>
+                        <a:t>개인정보 수정 화면으로 이동</a:t>
+                      </a:r>
+                    </a:p>
+                  </a:txBody>
+                  <a:tcPr marL="121920" marR="121920" marT="60960" marB="60960"/>
+                </a:tc>
+                <a:extLst>
+                  <a:ext uri="{0D108BD9-81ED-4DB2-BD59-A6C34878D82A}">
+                    <a16:rowId xmlns:a16="http://schemas.microsoft.com/office/drawing/2014/main" xmlns="" val="10003"/>
+                  </a:ext>
+                </a:extLst>
+              </a:tr>
+              <a:tr h="620107">
+                <a:tc>
+                  <a:txBody>
+                    <a:bodyPr/>
+                    <a:lstStyle/>
+                    <a:p>
+                      <a:pPr algn="ctr" latinLnBrk="1">
+                        <a:lnSpc>
+                          <a:spcPts val="1800"/>
+                        </a:lnSpc>
+                      </a:pPr>
+                      <a:r>
+                        <a:rPr lang="en-US" altLang="ko-KR" sz="1300" dirty="0">
+                          <a:latin typeface="나눔바른고딕" panose="020B0603020101020101" pitchFamily="50" charset="-127"/>
+                          <a:ea typeface="나눔바른고딕" panose="020B0603020101020101" pitchFamily="50" charset="-127"/>
+                        </a:rPr>
+                        <a:t>4</a:t>
+                      </a:r>
+                      <a:endParaRPr lang="ko-KR" altLang="en-US" sz="1300" dirty="0">
+                        <a:latin typeface="나눔바른고딕" panose="020B0603020101020101" pitchFamily="50" charset="-127"/>
+                        <a:ea typeface="나눔바른고딕" panose="020B0603020101020101" pitchFamily="50" charset="-127"/>
+                      </a:endParaRPr>
+                    </a:p>
+                  </a:txBody>
+                  <a:tcPr marL="121920" marR="121920" marT="60960" marB="60960" anchor="ctr"/>
+                </a:tc>
+                <a:tc>
+                  <a:txBody>
+                    <a:bodyPr/>
+                    <a:lstStyle/>
+                    <a:p>
+                      <a:pPr algn="l" latinLnBrk="1">
+                        <a:lnSpc>
+                          <a:spcPts val="1800"/>
+                        </a:lnSpc>
+                      </a:pPr>
+                      <a:r>
+                        <a:rPr lang="ko-KR" altLang="en-US" sz="1200" b="1" i="0" u="none" strike="noStrike" kern="1200" cap="none" dirty="0">
+                          <a:solidFill>
+                            <a:srgbClr val="000000"/>
+                          </a:solidFill>
+                          <a:latin typeface="나눔바른고딕" panose="020B0603020101020101" pitchFamily="50" charset="-127"/>
+                          <a:ea typeface="나눔바른고딕" panose="020B0603020101020101" pitchFamily="50" charset="-127"/>
+                          <a:cs typeface="Arial" panose="020B0604020202020204" pitchFamily="34" charset="0"/>
+                          <a:sym typeface="Arial"/>
+                        </a:rPr>
+                        <a:t>내역조회 </a:t>
+                      </a:r>
+                      <a:r>
+                        <a:rPr lang="en-US" altLang="ko-KR" sz="1200" b="1" i="0" u="none" strike="noStrike" kern="1200" cap="none" dirty="0">
+                          <a:solidFill>
+                            <a:srgbClr val="000000"/>
+                          </a:solidFill>
+                          <a:latin typeface="나눔바른고딕" panose="020B0603020101020101" pitchFamily="50" charset="-127"/>
+                          <a:ea typeface="나눔바른고딕" panose="020B0603020101020101" pitchFamily="50" charset="-127"/>
+                          <a:cs typeface="Arial" panose="020B0604020202020204" pitchFamily="34" charset="0"/>
+                          <a:sym typeface="Arial"/>
+                        </a:rPr>
+                        <a:t>(</a:t>
+                      </a:r>
+                      <a:r>
+                        <a:rPr lang="ko-KR" altLang="en-US" sz="1200" b="1" i="0" u="none" strike="noStrike" kern="1200" cap="none" dirty="0">
+                          <a:solidFill>
+                            <a:srgbClr val="000000"/>
+                          </a:solidFill>
+                          <a:latin typeface="나눔바른고딕" panose="020B0603020101020101" pitchFamily="50" charset="-127"/>
+                          <a:ea typeface="나눔바른고딕" panose="020B0603020101020101" pitchFamily="50" charset="-127"/>
+                          <a:cs typeface="Arial" panose="020B0604020202020204" pitchFamily="34" charset="0"/>
+                          <a:sym typeface="Arial"/>
+                        </a:rPr>
+                        <a:t>탭</a:t>
+                      </a:r>
+                      <a:r>
+                        <a:rPr lang="en-US" altLang="ko-KR" sz="1200" b="1" i="0" u="none" strike="noStrike" kern="1200" cap="none" dirty="0">
+                          <a:solidFill>
+                            <a:srgbClr val="000000"/>
+                          </a:solidFill>
+                          <a:latin typeface="나눔바른고딕" panose="020B0603020101020101" pitchFamily="50" charset="-127"/>
+                          <a:ea typeface="나눔바른고딕" panose="020B0603020101020101" pitchFamily="50" charset="-127"/>
+                          <a:cs typeface="Arial" panose="020B0604020202020204" pitchFamily="34" charset="0"/>
+                          <a:sym typeface="Arial"/>
+                        </a:rPr>
+                        <a:t>)</a:t>
+                      </a:r>
+                    </a:p>
+                    <a:p>
+                      <a:pPr algn="l" latinLnBrk="1">
+                        <a:lnSpc>
+                          <a:spcPts val="1800"/>
+                        </a:lnSpc>
+                      </a:pPr>
+                      <a:r>
+                        <a:rPr lang="en-US" altLang="ko-KR" sz="1200" b="0" i="0" u="none" strike="noStrike" kern="1200" cap="none" dirty="0">
+                          <a:solidFill>
+                            <a:srgbClr val="000000"/>
+                          </a:solidFill>
+                          <a:latin typeface="나눔바른고딕" panose="020B0603020101020101" pitchFamily="50" charset="-127"/>
+                          <a:ea typeface="나눔바른고딕" panose="020B0603020101020101" pitchFamily="50" charset="-127"/>
+                          <a:cs typeface="Arial" panose="020B0604020202020204" pitchFamily="34" charset="0"/>
+                          <a:sym typeface="Arial"/>
+                        </a:rPr>
+                        <a:t>-</a:t>
+                      </a:r>
+                      <a:r>
+                        <a:rPr lang="en-US" altLang="ko-KR" sz="1200" b="0" i="0" u="none" strike="noStrike" kern="1200" cap="none" baseline="0" dirty="0">
+                          <a:solidFill>
+                            <a:srgbClr val="000000"/>
+                          </a:solidFill>
+                          <a:latin typeface="나눔바른고딕" panose="020B0603020101020101" pitchFamily="50" charset="-127"/>
+                          <a:ea typeface="나눔바른고딕" panose="020B0603020101020101" pitchFamily="50" charset="-127"/>
+                          <a:cs typeface="Arial" panose="020B0604020202020204" pitchFamily="34" charset="0"/>
+                          <a:sym typeface="Arial"/>
+                        </a:rPr>
+                        <a:t> </a:t>
+                      </a:r>
+                      <a:r>
+                        <a:rPr lang="ko-KR" altLang="en-US" sz="1200" b="0" i="0" u="none" strike="noStrike" kern="1200" cap="none" baseline="0" dirty="0">
+                          <a:solidFill>
+                            <a:srgbClr val="000000"/>
+                          </a:solidFill>
+                          <a:latin typeface="나눔바른고딕" panose="020B0603020101020101" pitchFamily="50" charset="-127"/>
+                          <a:ea typeface="나눔바른고딕" panose="020B0603020101020101" pitchFamily="50" charset="-127"/>
+                          <a:cs typeface="Arial" panose="020B0604020202020204" pitchFamily="34" charset="0"/>
+                          <a:sym typeface="Arial"/>
+                        </a:rPr>
+                        <a:t>내역이 없을 때는 빈 화면 으로 표시</a:t>
+                      </a:r>
+                      <a:endParaRPr lang="ko-KR" altLang="en-US" sz="1200" b="0" i="0" u="none" strike="noStrike" kern="1200" cap="none" dirty="0">
+                        <a:solidFill>
+                          <a:srgbClr val="000000"/>
+                        </a:solidFill>
+                        <a:latin typeface="나눔바른고딕" panose="020B0603020101020101" pitchFamily="50" charset="-127"/>
+                        <a:ea typeface="나눔바른고딕" panose="020B0603020101020101" pitchFamily="50" charset="-127"/>
+                        <a:cs typeface="Arial" panose="020B0604020202020204" pitchFamily="34" charset="0"/>
+                        <a:sym typeface="Arial"/>
+                      </a:endParaRPr>
+                    </a:p>
+                  </a:txBody>
+                  <a:tcPr marL="121920" marR="121920" marT="60960" marB="60960"/>
+                </a:tc>
+                <a:extLst>
+                  <a:ext uri="{0D108BD9-81ED-4DB2-BD59-A6C34878D82A}">
+                    <a16:rowId xmlns:a16="http://schemas.microsoft.com/office/drawing/2014/main" xmlns="" val="10004"/>
+                  </a:ext>
+                </a:extLst>
+              </a:tr>
+            </a:tbl>
+          </a:graphicData>
+        </a:graphic>
+      </p:graphicFrame>
+      <p:sp>
+        <p:nvSpPr>
+          <p:cNvPr id="24" name="직사각형 23"/>
+          <p:cNvSpPr/>
+          <p:nvPr/>
+        </p:nvSpPr>
+        <p:spPr>
+          <a:xfrm>
+            <a:off x="1081171" y="1433634"/>
+            <a:ext cx="7895148" cy="4875687"/>
+          </a:xfrm>
+          <a:prstGeom prst="rect">
+            <a:avLst/>
+          </a:prstGeom>
+          <a:solidFill>
+            <a:schemeClr val="bg1"/>
+          </a:solidFill>
+          <a:ln w="9525">
+            <a:solidFill>
+              <a:schemeClr val="tx1"/>
+            </a:solidFill>
+          </a:ln>
+        </p:spPr>
+        <p:style>
+          <a:lnRef idx="2">
+            <a:schemeClr val="accent1">
+              <a:shade val="50000"/>
+            </a:schemeClr>
+          </a:lnRef>
+          <a:fillRef idx="1">
+            <a:schemeClr val="accent1"/>
+          </a:fillRef>
+          <a:effectRef idx="0">
+            <a:schemeClr val="accent1"/>
+          </a:effectRef>
+          <a:fontRef idx="minor">
+            <a:schemeClr val="lt1"/>
+          </a:fontRef>
+        </p:style>
+        <p:txBody>
+          <a:bodyPr lIns="121917" tIns="60958" rIns="121917" bIns="60958" rtlCol="0" anchor="ctr"/>
+          <a:lstStyle/>
+          <a:p>
+            <a:pPr algn="ctr"/>
+            <a:endParaRPr lang="ko-KR" altLang="en-US" dirty="0">
+              <a:noFill/>
+              <a:latin typeface="나눔바른고딕" panose="020B0603020101020101" pitchFamily="50" charset="-127"/>
+              <a:ea typeface="나눔바른고딕" panose="020B0603020101020101" pitchFamily="50" charset="-127"/>
+            </a:endParaRPr>
+          </a:p>
+        </p:txBody>
+      </p:sp>
+      <p:sp>
+        <p:nvSpPr>
+          <p:cNvPr id="25" name="직사각형 24"/>
+          <p:cNvSpPr/>
+          <p:nvPr/>
+        </p:nvSpPr>
+        <p:spPr>
+          <a:xfrm>
+            <a:off x="3329364" y="2521717"/>
+            <a:ext cx="260566" cy="217585"/>
+          </a:xfrm>
+          <a:prstGeom prst="rect">
+            <a:avLst/>
+          </a:prstGeom>
+          <a:solidFill>
+            <a:srgbClr val="FF9E00"/>
+          </a:solidFill>
+          <a:ln>
+            <a:noFill/>
+          </a:ln>
+        </p:spPr>
+        <p:style>
+          <a:lnRef idx="2">
+            <a:schemeClr val="accent1">
+              <a:shade val="50000"/>
+            </a:schemeClr>
+          </a:lnRef>
+          <a:fillRef idx="1">
+            <a:schemeClr val="accent1"/>
+          </a:fillRef>
+          <a:effectRef idx="0">
+            <a:schemeClr val="accent1"/>
+          </a:effectRef>
+          <a:fontRef idx="minor">
+            <a:schemeClr val="lt1"/>
+          </a:fontRef>
+        </p:style>
+        <p:txBody>
+          <a:bodyPr rtlCol="0" anchor="ctr"/>
+          <a:lstStyle/>
+          <a:p>
+            <a:pPr algn="ctr"/>
+            <a:r>
+              <a:rPr lang="en-US" altLang="ko-KR" sz="1100" b="1" dirty="0"/>
+              <a:t>1</a:t>
+            </a:r>
+            <a:endParaRPr lang="ko-KR" altLang="en-US" sz="1100" b="1" dirty="0"/>
+          </a:p>
+        </p:txBody>
+      </p:sp>
+      <p:sp>
+        <p:nvSpPr>
+          <p:cNvPr id="26" name="직사각형 25"/>
+          <p:cNvSpPr/>
+          <p:nvPr/>
+        </p:nvSpPr>
+        <p:spPr>
+          <a:xfrm>
+            <a:off x="3329364" y="3053739"/>
+            <a:ext cx="260566" cy="217585"/>
+          </a:xfrm>
+          <a:prstGeom prst="rect">
+            <a:avLst/>
+          </a:prstGeom>
+          <a:solidFill>
+            <a:srgbClr val="FF9E00"/>
+          </a:solidFill>
+          <a:ln>
+            <a:noFill/>
+          </a:ln>
+        </p:spPr>
+        <p:style>
+          <a:lnRef idx="2">
+            <a:schemeClr val="accent1">
+              <a:shade val="50000"/>
+            </a:schemeClr>
+          </a:lnRef>
+          <a:fillRef idx="1">
+            <a:schemeClr val="accent1"/>
+          </a:fillRef>
+          <a:effectRef idx="0">
+            <a:schemeClr val="accent1"/>
+          </a:effectRef>
+          <a:fontRef idx="minor">
+            <a:schemeClr val="lt1"/>
+          </a:fontRef>
+        </p:style>
+        <p:txBody>
+          <a:bodyPr rtlCol="0" anchor="ctr"/>
+          <a:lstStyle/>
+          <a:p>
+            <a:pPr algn="ctr"/>
+            <a:r>
+              <a:rPr lang="en-US" altLang="ko-KR" sz="1100" b="1" dirty="0"/>
+              <a:t>3</a:t>
+            </a:r>
+            <a:endParaRPr lang="ko-KR" altLang="en-US" sz="1100" b="1" dirty="0"/>
+          </a:p>
+        </p:txBody>
+      </p:sp>
+      <p:sp>
+        <p:nvSpPr>
+          <p:cNvPr id="27" name="직사각형 26"/>
+          <p:cNvSpPr/>
+          <p:nvPr/>
+        </p:nvSpPr>
+        <p:spPr>
+          <a:xfrm>
+            <a:off x="3732696" y="1461140"/>
+            <a:ext cx="2727145" cy="4780769"/>
+          </a:xfrm>
+          <a:prstGeom prst="rect">
+            <a:avLst/>
+          </a:prstGeom>
+          <a:solidFill>
+            <a:schemeClr val="bg1"/>
+          </a:solidFill>
+          <a:ln w="9525">
+            <a:solidFill>
+              <a:schemeClr val="tx1"/>
+            </a:solidFill>
+          </a:ln>
+        </p:spPr>
+        <p:style>
+          <a:lnRef idx="2">
+            <a:schemeClr val="accent1">
+              <a:shade val="50000"/>
+            </a:schemeClr>
+          </a:lnRef>
+          <a:fillRef idx="1">
+            <a:schemeClr val="accent1"/>
+          </a:fillRef>
+          <a:effectRef idx="0">
+            <a:schemeClr val="accent1"/>
+          </a:effectRef>
+          <a:fontRef idx="minor">
+            <a:schemeClr val="lt1"/>
+          </a:fontRef>
+        </p:style>
+        <p:txBody>
+          <a:bodyPr lIns="121917" tIns="60958" rIns="121917" bIns="60958" rtlCol="0" anchor="ctr"/>
+          <a:lstStyle/>
+          <a:p>
+            <a:pPr algn="ctr"/>
+            <a:endParaRPr lang="ko-KR" altLang="en-US" dirty="0">
+              <a:noFill/>
+              <a:latin typeface="나눔바른고딕" panose="020B0603020101020101" pitchFamily="50" charset="-127"/>
+              <a:ea typeface="나눔바른고딕" panose="020B0603020101020101" pitchFamily="50" charset="-127"/>
+            </a:endParaRPr>
+          </a:p>
+        </p:txBody>
+      </p:sp>
+      <p:sp>
+        <p:nvSpPr>
+          <p:cNvPr id="28" name="직사각형 27"/>
+          <p:cNvSpPr/>
+          <p:nvPr/>
+        </p:nvSpPr>
+        <p:spPr>
+          <a:xfrm>
+            <a:off x="3758737" y="1761384"/>
+            <a:ext cx="795866" cy="330201"/>
+          </a:xfrm>
+          <a:prstGeom prst="rect">
+            <a:avLst/>
+          </a:prstGeom>
+          <a:solidFill>
+            <a:schemeClr val="bg1"/>
+          </a:solidFill>
+          <a:ln>
+            <a:solidFill>
+              <a:schemeClr val="bg1"/>
+            </a:solidFill>
+          </a:ln>
+        </p:spPr>
+        <p:style>
+          <a:lnRef idx="2">
+            <a:schemeClr val="accent1">
+              <a:shade val="50000"/>
+            </a:schemeClr>
+          </a:lnRef>
+          <a:fillRef idx="1">
+            <a:schemeClr val="accent1"/>
+          </a:fillRef>
+          <a:effectRef idx="0">
+            <a:schemeClr val="accent1"/>
+          </a:effectRef>
+          <a:fontRef idx="minor">
+            <a:schemeClr val="lt1"/>
+          </a:fontRef>
+        </p:style>
+        <p:txBody>
+          <a:bodyPr rtlCol="0" anchor="ctr"/>
+          <a:lstStyle/>
+          <a:p>
+            <a:pPr algn="ctr"/>
+            <a:r>
+              <a:rPr lang="ko-KR" altLang="en-US" sz="1600" b="1" dirty="0">
+                <a:solidFill>
+                  <a:schemeClr val="tx1"/>
+                </a:solidFill>
+                <a:latin typeface="나눔바른고딕" panose="020B0603020101020101" pitchFamily="50" charset="-127"/>
+                <a:ea typeface="나눔바른고딕" panose="020B0603020101020101" pitchFamily="50" charset="-127"/>
+              </a:rPr>
+              <a:t>홍길동</a:t>
+            </a:r>
+          </a:p>
+        </p:txBody>
+      </p:sp>
+      <p:sp>
+        <p:nvSpPr>
+          <p:cNvPr id="29" name="직사각형 28"/>
+          <p:cNvSpPr/>
+          <p:nvPr/>
+        </p:nvSpPr>
+        <p:spPr>
+          <a:xfrm>
+            <a:off x="3809536" y="2097830"/>
+            <a:ext cx="914402" cy="165101"/>
+          </a:xfrm>
+          <a:prstGeom prst="rect">
+            <a:avLst/>
+          </a:prstGeom>
+          <a:solidFill>
+            <a:schemeClr val="bg1"/>
+          </a:solidFill>
+          <a:ln>
+            <a:solidFill>
+              <a:schemeClr val="bg1"/>
+            </a:solidFill>
+          </a:ln>
+        </p:spPr>
+        <p:style>
+          <a:lnRef idx="2">
+            <a:schemeClr val="accent1">
+              <a:shade val="50000"/>
+            </a:schemeClr>
+          </a:lnRef>
+          <a:fillRef idx="1">
+            <a:schemeClr val="accent1"/>
+          </a:fillRef>
+          <a:effectRef idx="0">
+            <a:schemeClr val="accent1"/>
+          </a:effectRef>
+          <a:fontRef idx="minor">
+            <a:schemeClr val="lt1"/>
+          </a:fontRef>
+        </p:style>
+        <p:txBody>
+          <a:bodyPr rtlCol="0" anchor="ctr"/>
+          <a:lstStyle/>
+          <a:p>
+            <a:r>
+              <a:rPr lang="ko-KR" altLang="en-US" sz="800" dirty="0">
+                <a:solidFill>
+                  <a:schemeClr val="tx1">
+                    <a:lumMod val="65000"/>
+                    <a:lumOff val="35000"/>
+                  </a:schemeClr>
+                </a:solidFill>
+                <a:latin typeface="나눔바른고딕" panose="020B0603020101020101" pitchFamily="50" charset="-127"/>
+                <a:ea typeface="나눔바른고딕" panose="020B0603020101020101" pitchFamily="50" charset="-127"/>
+              </a:rPr>
+              <a:t>서포터회원</a:t>
+            </a:r>
+          </a:p>
+        </p:txBody>
+      </p:sp>
+      <p:sp>
+        <p:nvSpPr>
+          <p:cNvPr id="33" name="직사각형 32"/>
+          <p:cNvSpPr/>
+          <p:nvPr/>
+        </p:nvSpPr>
+        <p:spPr>
+          <a:xfrm>
+            <a:off x="3834300" y="2373116"/>
+            <a:ext cx="270935" cy="330201"/>
+          </a:xfrm>
+          <a:prstGeom prst="rect">
+            <a:avLst/>
+          </a:prstGeom>
+          <a:solidFill>
+            <a:schemeClr val="bg1"/>
+          </a:solidFill>
+          <a:ln>
+            <a:solidFill>
+              <a:schemeClr val="bg1"/>
+            </a:solidFill>
+          </a:ln>
+        </p:spPr>
+        <p:style>
+          <a:lnRef idx="2">
+            <a:schemeClr val="accent1">
+              <a:shade val="50000"/>
+            </a:schemeClr>
+          </a:lnRef>
+          <a:fillRef idx="1">
+            <a:schemeClr val="accent1"/>
+          </a:fillRef>
+          <a:effectRef idx="0">
+            <a:schemeClr val="accent1"/>
+          </a:effectRef>
+          <a:fontRef idx="minor">
+            <a:schemeClr val="lt1"/>
+          </a:fontRef>
+        </p:style>
+        <p:txBody>
+          <a:bodyPr rtlCol="0" anchor="ctr"/>
+          <a:lstStyle/>
+          <a:p>
+            <a:pPr algn="ctr"/>
+            <a:r>
+              <a:rPr lang="en-US" altLang="ko-KR" sz="1300" dirty="0">
+                <a:solidFill>
+                  <a:schemeClr val="accent1">
+                    <a:lumMod val="50000"/>
+                  </a:schemeClr>
+                </a:solidFill>
+                <a:latin typeface="나눔바른고딕" panose="020B0603020101020101" pitchFamily="50" charset="-127"/>
+                <a:ea typeface="나눔바른고딕" panose="020B0603020101020101" pitchFamily="50" charset="-127"/>
+              </a:rPr>
+              <a:t>2</a:t>
+            </a:r>
+            <a:endParaRPr lang="ko-KR" altLang="en-US" sz="1300" dirty="0">
+              <a:solidFill>
+                <a:schemeClr val="accent1">
+                  <a:lumMod val="50000"/>
+                </a:schemeClr>
+              </a:solidFill>
+              <a:latin typeface="나눔바른고딕" panose="020B0603020101020101" pitchFamily="50" charset="-127"/>
+              <a:ea typeface="나눔바른고딕" panose="020B0603020101020101" pitchFamily="50" charset="-127"/>
+            </a:endParaRPr>
+          </a:p>
+        </p:txBody>
+      </p:sp>
+      <p:sp>
+        <p:nvSpPr>
+          <p:cNvPr id="34" name="직사각형 33"/>
+          <p:cNvSpPr/>
+          <p:nvPr/>
+        </p:nvSpPr>
+        <p:spPr>
+          <a:xfrm>
+            <a:off x="4249164" y="2373116"/>
+            <a:ext cx="270935" cy="330201"/>
+          </a:xfrm>
+          <a:prstGeom prst="rect">
+            <a:avLst/>
+          </a:prstGeom>
+          <a:solidFill>
+            <a:schemeClr val="bg1"/>
+          </a:solidFill>
+          <a:ln>
+            <a:solidFill>
+              <a:schemeClr val="bg1"/>
+            </a:solidFill>
+          </a:ln>
+        </p:spPr>
+        <p:style>
+          <a:lnRef idx="2">
+            <a:schemeClr val="accent1">
+              <a:shade val="50000"/>
+            </a:schemeClr>
+          </a:lnRef>
+          <a:fillRef idx="1">
+            <a:schemeClr val="accent1"/>
+          </a:fillRef>
+          <a:effectRef idx="0">
+            <a:schemeClr val="accent1"/>
+          </a:effectRef>
+          <a:fontRef idx="minor">
+            <a:schemeClr val="lt1"/>
+          </a:fontRef>
+        </p:style>
+        <p:txBody>
+          <a:bodyPr rtlCol="0" anchor="ctr"/>
+          <a:lstStyle/>
+          <a:p>
+            <a:pPr algn="ctr"/>
+            <a:r>
+              <a:rPr lang="en-US" altLang="ko-KR" sz="1300" dirty="0">
+                <a:solidFill>
+                  <a:schemeClr val="accent1">
+                    <a:lumMod val="50000"/>
+                  </a:schemeClr>
+                </a:solidFill>
+                <a:latin typeface="나눔바른고딕" panose="020B0603020101020101" pitchFamily="50" charset="-127"/>
+                <a:ea typeface="나눔바른고딕" panose="020B0603020101020101" pitchFamily="50" charset="-127"/>
+              </a:rPr>
+              <a:t>3</a:t>
+            </a:r>
+            <a:endParaRPr lang="ko-KR" altLang="en-US" sz="1300" dirty="0">
+              <a:solidFill>
+                <a:schemeClr val="accent1">
+                  <a:lumMod val="50000"/>
+                </a:schemeClr>
+              </a:solidFill>
+              <a:latin typeface="나눔바른고딕" panose="020B0603020101020101" pitchFamily="50" charset="-127"/>
+              <a:ea typeface="나눔바른고딕" panose="020B0603020101020101" pitchFamily="50" charset="-127"/>
+            </a:endParaRPr>
+          </a:p>
+        </p:txBody>
+      </p:sp>
+      <p:sp>
+        <p:nvSpPr>
+          <p:cNvPr id="35" name="직사각형 34"/>
+          <p:cNvSpPr/>
+          <p:nvPr/>
+        </p:nvSpPr>
+        <p:spPr>
+          <a:xfrm>
+            <a:off x="3758575" y="2674004"/>
+            <a:ext cx="414862" cy="137305"/>
+          </a:xfrm>
+          <a:prstGeom prst="rect">
+            <a:avLst/>
+          </a:prstGeom>
+          <a:solidFill>
+            <a:schemeClr val="bg1"/>
+          </a:solidFill>
+          <a:ln>
+            <a:solidFill>
+              <a:schemeClr val="bg1"/>
+            </a:solidFill>
+          </a:ln>
+        </p:spPr>
+        <p:style>
+          <a:lnRef idx="2">
+            <a:schemeClr val="accent1">
+              <a:shade val="50000"/>
+            </a:schemeClr>
+          </a:lnRef>
+          <a:fillRef idx="1">
+            <a:schemeClr val="accent1"/>
+          </a:fillRef>
+          <a:effectRef idx="0">
+            <a:schemeClr val="accent1"/>
+          </a:effectRef>
+          <a:fontRef idx="minor">
+            <a:schemeClr val="lt1"/>
+          </a:fontRef>
+        </p:style>
+        <p:txBody>
+          <a:bodyPr rtlCol="0" anchor="ctr"/>
+          <a:lstStyle/>
+          <a:p>
+            <a:pPr algn="r"/>
+            <a:r>
+              <a:rPr lang="ko-KR" altLang="en-US" sz="800" dirty="0" err="1">
+                <a:solidFill>
+                  <a:schemeClr val="tx1">
+                    <a:lumMod val="65000"/>
+                    <a:lumOff val="35000"/>
+                  </a:schemeClr>
+                </a:solidFill>
+                <a:latin typeface="나눔바른고딕" panose="020B0603020101020101" pitchFamily="50" charset="-127"/>
+                <a:ea typeface="나눔바른고딕" panose="020B0603020101020101" pitchFamily="50" charset="-127"/>
+              </a:rPr>
+              <a:t>펀딩</a:t>
+            </a:r>
+            <a:endParaRPr lang="ko-KR" altLang="en-US" sz="800" dirty="0">
+              <a:solidFill>
+                <a:schemeClr val="tx1">
+                  <a:lumMod val="65000"/>
+                  <a:lumOff val="35000"/>
+                </a:schemeClr>
+              </a:solidFill>
+              <a:latin typeface="나눔바른고딕" panose="020B0603020101020101" pitchFamily="50" charset="-127"/>
+              <a:ea typeface="나눔바른고딕" panose="020B0603020101020101" pitchFamily="50" charset="-127"/>
+            </a:endParaRPr>
+          </a:p>
+        </p:txBody>
+      </p:sp>
+      <p:sp>
+        <p:nvSpPr>
+          <p:cNvPr id="36" name="직사각형 35"/>
+          <p:cNvSpPr/>
+          <p:nvPr/>
+        </p:nvSpPr>
+        <p:spPr>
+          <a:xfrm>
+            <a:off x="4206832" y="2656752"/>
+            <a:ext cx="524931" cy="165101"/>
+          </a:xfrm>
+          <a:prstGeom prst="rect">
+            <a:avLst/>
+          </a:prstGeom>
+          <a:solidFill>
+            <a:schemeClr val="bg1"/>
+          </a:solidFill>
+          <a:ln>
+            <a:solidFill>
+              <a:schemeClr val="bg1"/>
+            </a:solidFill>
+          </a:ln>
+        </p:spPr>
+        <p:style>
+          <a:lnRef idx="2">
+            <a:schemeClr val="accent1">
+              <a:shade val="50000"/>
+            </a:schemeClr>
+          </a:lnRef>
+          <a:fillRef idx="1">
+            <a:schemeClr val="accent1"/>
+          </a:fillRef>
+          <a:effectRef idx="0">
+            <a:schemeClr val="accent1"/>
+          </a:effectRef>
+          <a:fontRef idx="minor">
+            <a:schemeClr val="lt1"/>
+          </a:fontRef>
+        </p:style>
+        <p:txBody>
+          <a:bodyPr rtlCol="0" anchor="ctr"/>
+          <a:lstStyle/>
+          <a:p>
+            <a:r>
+              <a:rPr lang="ko-KR" altLang="en-US" sz="800" dirty="0">
+                <a:solidFill>
+                  <a:schemeClr val="tx1">
+                    <a:lumMod val="65000"/>
+                    <a:lumOff val="35000"/>
+                  </a:schemeClr>
+                </a:solidFill>
+                <a:latin typeface="나눔바른고딕" panose="020B0603020101020101" pitchFamily="50" charset="-127"/>
+                <a:ea typeface="나눔바른고딕" panose="020B0603020101020101" pitchFamily="50" charset="-127"/>
+              </a:rPr>
+              <a:t>주문</a:t>
+            </a:r>
+          </a:p>
+        </p:txBody>
+      </p:sp>
+      <p:sp>
+        <p:nvSpPr>
+          <p:cNvPr id="37" name="직사각형 36"/>
+          <p:cNvSpPr/>
+          <p:nvPr/>
+        </p:nvSpPr>
+        <p:spPr>
+          <a:xfrm>
+            <a:off x="3852984" y="3005496"/>
+            <a:ext cx="719670" cy="306575"/>
+          </a:xfrm>
+          <a:prstGeom prst="rect">
+            <a:avLst/>
+          </a:prstGeom>
+          <a:solidFill>
+            <a:schemeClr val="bg1"/>
+          </a:solidFill>
+          <a:ln>
+            <a:solidFill>
+              <a:schemeClr val="bg1">
+                <a:lumMod val="75000"/>
+              </a:schemeClr>
+            </a:solidFill>
+          </a:ln>
+        </p:spPr>
+        <p:style>
+          <a:lnRef idx="2">
+            <a:schemeClr val="accent1">
+              <a:shade val="50000"/>
+            </a:schemeClr>
+          </a:lnRef>
+          <a:fillRef idx="1">
+            <a:schemeClr val="accent1"/>
+          </a:fillRef>
+          <a:effectRef idx="0">
+            <a:schemeClr val="accent1"/>
+          </a:effectRef>
+          <a:fontRef idx="minor">
+            <a:schemeClr val="lt1"/>
+          </a:fontRef>
+        </p:style>
+        <p:txBody>
+          <a:bodyPr rtlCol="0" anchor="ctr"/>
+          <a:lstStyle/>
+          <a:p>
+            <a:pPr algn="ctr"/>
+            <a:r>
+              <a:rPr lang="ko-KR" altLang="en-US" sz="800" b="1" dirty="0">
+                <a:solidFill>
+                  <a:schemeClr val="bg1">
+                    <a:lumMod val="50000"/>
+                  </a:schemeClr>
+                </a:solidFill>
+                <a:latin typeface="나눔바른고딕" panose="020B0603020101020101" pitchFamily="50" charset="-127"/>
+                <a:ea typeface="나눔바른고딕" panose="020B0603020101020101" pitchFamily="50" charset="-127"/>
+              </a:rPr>
+              <a:t>프로필편집</a:t>
+            </a:r>
+          </a:p>
+        </p:txBody>
+      </p:sp>
+      <p:sp>
+        <p:nvSpPr>
+          <p:cNvPr id="38" name="직사각형 37"/>
+          <p:cNvSpPr/>
+          <p:nvPr/>
+        </p:nvSpPr>
+        <p:spPr>
+          <a:xfrm>
+            <a:off x="4699653" y="3005496"/>
+            <a:ext cx="719670" cy="306575"/>
+          </a:xfrm>
+          <a:prstGeom prst="rect">
+            <a:avLst/>
+          </a:prstGeom>
+          <a:solidFill>
+            <a:schemeClr val="bg1"/>
+          </a:solidFill>
+          <a:ln>
+            <a:solidFill>
+              <a:schemeClr val="bg1">
+                <a:lumMod val="75000"/>
+              </a:schemeClr>
+            </a:solidFill>
+          </a:ln>
+        </p:spPr>
+        <p:style>
+          <a:lnRef idx="2">
+            <a:schemeClr val="accent1">
+              <a:shade val="50000"/>
+            </a:schemeClr>
+          </a:lnRef>
+          <a:fillRef idx="1">
+            <a:schemeClr val="accent1"/>
+          </a:fillRef>
+          <a:effectRef idx="0">
+            <a:schemeClr val="accent1"/>
+          </a:effectRef>
+          <a:fontRef idx="minor">
+            <a:schemeClr val="lt1"/>
+          </a:fontRef>
+        </p:style>
+        <p:txBody>
+          <a:bodyPr rtlCol="0" anchor="ctr"/>
+          <a:lstStyle/>
+          <a:p>
+            <a:pPr algn="ctr"/>
+            <a:r>
+              <a:rPr lang="ko-KR" altLang="en-US" sz="800" b="1" dirty="0">
+                <a:solidFill>
+                  <a:schemeClr val="bg1">
+                    <a:lumMod val="50000"/>
+                  </a:schemeClr>
+                </a:solidFill>
+                <a:latin typeface="나눔바른고딕" panose="020B0603020101020101" pitchFamily="50" charset="-127"/>
+                <a:ea typeface="나눔바른고딕" panose="020B0603020101020101" pitchFamily="50" charset="-127"/>
+              </a:rPr>
+              <a:t>회원탈퇴</a:t>
+            </a:r>
+          </a:p>
+        </p:txBody>
+      </p:sp>
+      <p:sp>
+        <p:nvSpPr>
+          <p:cNvPr id="44" name="직사각형 43"/>
+          <p:cNvSpPr/>
+          <p:nvPr/>
+        </p:nvSpPr>
+        <p:spPr>
+          <a:xfrm>
+            <a:off x="5562796" y="3005496"/>
+            <a:ext cx="719670" cy="306575"/>
+          </a:xfrm>
+          <a:prstGeom prst="rect">
+            <a:avLst/>
+          </a:prstGeom>
+          <a:solidFill>
+            <a:schemeClr val="bg1"/>
+          </a:solidFill>
+          <a:ln>
+            <a:solidFill>
+              <a:schemeClr val="bg1">
+                <a:lumMod val="75000"/>
+              </a:schemeClr>
+            </a:solidFill>
+          </a:ln>
+        </p:spPr>
+        <p:style>
+          <a:lnRef idx="2">
+            <a:schemeClr val="accent1">
+              <a:shade val="50000"/>
+            </a:schemeClr>
+          </a:lnRef>
+          <a:fillRef idx="1">
+            <a:schemeClr val="accent1"/>
+          </a:fillRef>
+          <a:effectRef idx="0">
+            <a:schemeClr val="accent1"/>
+          </a:effectRef>
+          <a:fontRef idx="minor">
+            <a:schemeClr val="lt1"/>
+          </a:fontRef>
+        </p:style>
+        <p:txBody>
+          <a:bodyPr rtlCol="0" anchor="ctr"/>
+          <a:lstStyle/>
+          <a:p>
+            <a:pPr algn="ctr"/>
+            <a:r>
+              <a:rPr lang="ko-KR" altLang="en-US" sz="800" b="1" dirty="0">
+                <a:solidFill>
+                  <a:schemeClr val="bg1">
+                    <a:lumMod val="50000"/>
+                  </a:schemeClr>
+                </a:solidFill>
+                <a:latin typeface="나눔바른고딕" panose="020B0603020101020101" pitchFamily="50" charset="-127"/>
+                <a:ea typeface="나눔바른고딕" panose="020B0603020101020101" pitchFamily="50" charset="-127"/>
+              </a:rPr>
+              <a:t>계좌정보</a:t>
+            </a:r>
+          </a:p>
+        </p:txBody>
+      </p:sp>
+      <p:pic>
+        <p:nvPicPr>
+          <p:cNvPr id="45" name="Picture 2"/>
+          <p:cNvPicPr>
+            <a:picLocks noChangeAspect="1" noChangeArrowheads="1"/>
+          </p:cNvPicPr>
+          <p:nvPr/>
+        </p:nvPicPr>
+        <p:blipFill>
+          <a:blip r:embed="rId2">
+            <a:extLst>
+              <a:ext uri="{28A0092B-C50C-407E-A947-70E740481C1C}">
+                <a14:useLocalDpi xmlns:a14="http://schemas.microsoft.com/office/drawing/2010/main" val="0"/>
+              </a:ext>
+            </a:extLst>
+          </a:blip>
+          <a:srcRect/>
+          <a:stretch>
+            <a:fillRect/>
+          </a:stretch>
+        </p:blipFill>
+        <p:spPr bwMode="auto">
+          <a:xfrm>
+            <a:off x="5534297" y="1680952"/>
+            <a:ext cx="801453" cy="692164"/>
+          </a:xfrm>
+          <a:prstGeom prst="rect">
+            <a:avLst/>
+          </a:prstGeom>
+          <a:noFill/>
+          <a:ln>
+            <a:noFill/>
+          </a:ln>
+          <a:effectLst/>
+          <a:extLst>
+            <a:ext uri="{909E8E84-426E-40DD-AFC4-6F175D3DCCD1}">
+              <a14:hiddenFill xmlns:a14="http://schemas.microsoft.com/office/drawing/2010/main">
+                <a:solidFill>
+                  <a:schemeClr val="accent1"/>
+                </a:solidFill>
+              </a14:hiddenFill>
+            </a:ext>
+            <a:ext uri="{91240B29-F687-4F45-9708-019B960494DF}">
+              <a14:hiddenLine xmlns:a14="http://schemas.microsoft.com/office/drawing/2010/main" w="9525">
+                <a:solidFill>
+                  <a:schemeClr val="tx1"/>
+                </a:solidFill>
+                <a:miter lim="800000"/>
+                <a:headEnd/>
+                <a:tailEnd/>
+              </a14:hiddenLine>
+            </a:ext>
+            <a:ext uri="{AF507438-7753-43E0-B8FC-AC1667EBCBE1}">
+              <a14:hiddenEffects xmlns:a14="http://schemas.microsoft.com/office/drawing/2010/main">
+                <a:effectLst>
+                  <a:outerShdw dist="35921" dir="2700000" algn="ctr" rotWithShape="0">
+                    <a:schemeClr val="bg2"/>
+                  </a:outerShdw>
+                </a:effectLst>
+              </a14:hiddenEffects>
+            </a:ext>
+          </a:extLst>
+        </p:spPr>
+      </p:pic>
+      <p:sp>
+        <p:nvSpPr>
+          <p:cNvPr id="46" name="직사각형 45"/>
+          <p:cNvSpPr/>
+          <p:nvPr/>
+        </p:nvSpPr>
+        <p:spPr>
+          <a:xfrm>
+            <a:off x="3764875" y="3793068"/>
+            <a:ext cx="2694966" cy="2448842"/>
+          </a:xfrm>
+          <a:prstGeom prst="rect">
+            <a:avLst/>
+          </a:prstGeom>
+          <a:solidFill>
+            <a:srgbClr val="F5F7FA"/>
+          </a:solidFill>
+          <a:ln w="9525">
+            <a:noFill/>
+          </a:ln>
+        </p:spPr>
+        <p:style>
+          <a:lnRef idx="2">
+            <a:schemeClr val="accent1">
+              <a:shade val="50000"/>
+            </a:schemeClr>
+          </a:lnRef>
+          <a:fillRef idx="1">
+            <a:schemeClr val="accent1"/>
+          </a:fillRef>
+          <a:effectRef idx="0">
+            <a:schemeClr val="accent1"/>
+          </a:effectRef>
+          <a:fontRef idx="minor">
+            <a:schemeClr val="lt1"/>
+          </a:fontRef>
+        </p:style>
+        <p:txBody>
+          <a:bodyPr lIns="121917" tIns="60958" rIns="121917" bIns="60958" rtlCol="0" anchor="ctr"/>
+          <a:lstStyle/>
+          <a:p>
+            <a:pPr algn="ctr"/>
+            <a:endParaRPr lang="ko-KR" altLang="en-US" dirty="0">
+              <a:noFill/>
+              <a:latin typeface="나눔바른고딕" panose="020B0603020101020101" pitchFamily="50" charset="-127"/>
+              <a:ea typeface="나눔바른고딕" panose="020B0603020101020101" pitchFamily="50" charset="-127"/>
+            </a:endParaRPr>
+          </a:p>
+        </p:txBody>
+      </p:sp>
+      <p:sp>
+        <p:nvSpPr>
+          <p:cNvPr id="47" name="직사각형 46"/>
+          <p:cNvSpPr/>
+          <p:nvPr/>
+        </p:nvSpPr>
+        <p:spPr>
+          <a:xfrm>
+            <a:off x="3768184" y="3555996"/>
+            <a:ext cx="880539" cy="165101"/>
+          </a:xfrm>
+          <a:prstGeom prst="rect">
+            <a:avLst/>
+          </a:prstGeom>
+          <a:solidFill>
+            <a:schemeClr val="bg1"/>
+          </a:solidFill>
+          <a:ln>
+            <a:solidFill>
+              <a:schemeClr val="bg1"/>
+            </a:solidFill>
+          </a:ln>
+        </p:spPr>
+        <p:style>
+          <a:lnRef idx="2">
+            <a:schemeClr val="accent1">
+              <a:shade val="50000"/>
+            </a:schemeClr>
+          </a:lnRef>
+          <a:fillRef idx="1">
+            <a:schemeClr val="accent1"/>
+          </a:fillRef>
+          <a:effectRef idx="0">
+            <a:schemeClr val="accent1"/>
+          </a:effectRef>
+          <a:fontRef idx="minor">
+            <a:schemeClr val="lt1"/>
+          </a:fontRef>
+        </p:style>
+        <p:txBody>
+          <a:bodyPr rtlCol="0" anchor="ctr"/>
+          <a:lstStyle/>
+          <a:p>
+            <a:r>
+              <a:rPr lang="ko-KR" altLang="en-US" sz="800" b="1" dirty="0">
+                <a:solidFill>
+                  <a:schemeClr val="tx1">
+                    <a:lumMod val="65000"/>
+                    <a:lumOff val="35000"/>
+                  </a:schemeClr>
+                </a:solidFill>
+                <a:latin typeface="나눔바른고딕" panose="020B0603020101020101" pitchFamily="50" charset="-127"/>
+                <a:ea typeface="나눔바른고딕" panose="020B0603020101020101" pitchFamily="50" charset="-127"/>
+              </a:rPr>
+              <a:t>관심프로젝트</a:t>
+            </a:r>
+            <a:endParaRPr lang="en-US" altLang="ko-KR" sz="800" b="1" dirty="0">
+              <a:solidFill>
+                <a:schemeClr val="tx1">
+                  <a:lumMod val="65000"/>
+                  <a:lumOff val="35000"/>
+                </a:schemeClr>
+              </a:solidFill>
+              <a:latin typeface="나눔바른고딕" panose="020B0603020101020101" pitchFamily="50" charset="-127"/>
+              <a:ea typeface="나눔바른고딕" panose="020B0603020101020101" pitchFamily="50" charset="-127"/>
+            </a:endParaRPr>
+          </a:p>
+        </p:txBody>
+      </p:sp>
+      <p:sp>
+        <p:nvSpPr>
+          <p:cNvPr id="48" name="직사각형 47"/>
+          <p:cNvSpPr/>
+          <p:nvPr/>
+        </p:nvSpPr>
+        <p:spPr>
+          <a:xfrm>
+            <a:off x="4626212" y="3555996"/>
+            <a:ext cx="761999" cy="165101"/>
+          </a:xfrm>
+          <a:prstGeom prst="rect">
+            <a:avLst/>
+          </a:prstGeom>
+          <a:solidFill>
+            <a:schemeClr val="bg1"/>
+          </a:solidFill>
+          <a:ln>
+            <a:solidFill>
+              <a:schemeClr val="bg1"/>
+            </a:solidFill>
+          </a:ln>
+        </p:spPr>
+        <p:style>
+          <a:lnRef idx="2">
+            <a:schemeClr val="accent1">
+              <a:shade val="50000"/>
+            </a:schemeClr>
+          </a:lnRef>
+          <a:fillRef idx="1">
+            <a:schemeClr val="accent1"/>
+          </a:fillRef>
+          <a:effectRef idx="0">
+            <a:schemeClr val="accent1"/>
+          </a:effectRef>
+          <a:fontRef idx="minor">
+            <a:schemeClr val="lt1"/>
+          </a:fontRef>
+        </p:style>
+        <p:txBody>
+          <a:bodyPr rtlCol="0" anchor="ctr"/>
+          <a:lstStyle/>
+          <a:p>
+            <a:r>
+              <a:rPr lang="ko-KR" altLang="en-US" sz="800" b="1" dirty="0">
+                <a:solidFill>
+                  <a:schemeClr val="tx1">
+                    <a:lumMod val="65000"/>
+                    <a:lumOff val="35000"/>
+                  </a:schemeClr>
+                </a:solidFill>
+                <a:latin typeface="나눔바른고딕" panose="020B0603020101020101" pitchFamily="50" charset="-127"/>
+                <a:ea typeface="나눔바른고딕" panose="020B0603020101020101" pitchFamily="50" charset="-127"/>
+              </a:rPr>
+              <a:t>참여한 </a:t>
+            </a:r>
+            <a:r>
+              <a:rPr lang="ko-KR" altLang="en-US" sz="800" b="1" dirty="0" err="1">
+                <a:solidFill>
+                  <a:schemeClr val="tx1">
+                    <a:lumMod val="65000"/>
+                    <a:lumOff val="35000"/>
+                  </a:schemeClr>
+                </a:solidFill>
+                <a:latin typeface="나눔바른고딕" panose="020B0603020101020101" pitchFamily="50" charset="-127"/>
+                <a:ea typeface="나눔바른고딕" panose="020B0603020101020101" pitchFamily="50" charset="-127"/>
+              </a:rPr>
+              <a:t>펀딩</a:t>
+            </a:r>
+            <a:endParaRPr lang="en-US" altLang="ko-KR" sz="800" b="1" dirty="0">
+              <a:solidFill>
+                <a:schemeClr val="tx1">
+                  <a:lumMod val="65000"/>
+                  <a:lumOff val="35000"/>
+                </a:schemeClr>
+              </a:solidFill>
+              <a:latin typeface="나눔바른고딕" panose="020B0603020101020101" pitchFamily="50" charset="-127"/>
+              <a:ea typeface="나눔바른고딕" panose="020B0603020101020101" pitchFamily="50" charset="-127"/>
+            </a:endParaRPr>
+          </a:p>
+        </p:txBody>
+      </p:sp>
+      <p:sp>
+        <p:nvSpPr>
+          <p:cNvPr id="49" name="직사각형 48"/>
+          <p:cNvSpPr/>
+          <p:nvPr/>
+        </p:nvSpPr>
+        <p:spPr>
+          <a:xfrm>
+            <a:off x="5459951" y="3555996"/>
+            <a:ext cx="875799" cy="165101"/>
+          </a:xfrm>
+          <a:prstGeom prst="rect">
+            <a:avLst/>
+          </a:prstGeom>
+          <a:solidFill>
+            <a:schemeClr val="bg1"/>
+          </a:solidFill>
+          <a:ln>
+            <a:solidFill>
+              <a:schemeClr val="bg1"/>
+            </a:solidFill>
+          </a:ln>
+        </p:spPr>
+        <p:style>
+          <a:lnRef idx="2">
+            <a:schemeClr val="accent1">
+              <a:shade val="50000"/>
+            </a:schemeClr>
+          </a:lnRef>
+          <a:fillRef idx="1">
+            <a:schemeClr val="accent1"/>
+          </a:fillRef>
+          <a:effectRef idx="0">
+            <a:schemeClr val="accent1"/>
+          </a:effectRef>
+          <a:fontRef idx="minor">
+            <a:schemeClr val="lt1"/>
+          </a:fontRef>
+        </p:style>
+        <p:txBody>
+          <a:bodyPr rtlCol="0" anchor="ctr"/>
+          <a:lstStyle/>
+          <a:p>
+            <a:r>
+              <a:rPr lang="ko-KR" altLang="en-US" sz="800" b="1" dirty="0">
+                <a:solidFill>
+                  <a:schemeClr val="tx1">
+                    <a:lumMod val="65000"/>
+                    <a:lumOff val="35000"/>
+                  </a:schemeClr>
+                </a:solidFill>
+                <a:latin typeface="나눔바른고딕" panose="020B0603020101020101" pitchFamily="50" charset="-127"/>
+                <a:ea typeface="나눔바른고딕" panose="020B0603020101020101" pitchFamily="50" charset="-127"/>
+              </a:rPr>
+              <a:t>주문 및 배송조회</a:t>
+            </a:r>
+            <a:endParaRPr lang="en-US" altLang="ko-KR" sz="800" b="1" dirty="0">
+              <a:solidFill>
+                <a:schemeClr val="tx1">
+                  <a:lumMod val="65000"/>
+                  <a:lumOff val="35000"/>
+                </a:schemeClr>
+              </a:solidFill>
+              <a:latin typeface="나눔바른고딕" panose="020B0603020101020101" pitchFamily="50" charset="-127"/>
+              <a:ea typeface="나눔바른고딕" panose="020B0603020101020101" pitchFamily="50" charset="-127"/>
+            </a:endParaRPr>
+          </a:p>
+        </p:txBody>
+      </p:sp>
+      <p:cxnSp>
+        <p:nvCxnSpPr>
+          <p:cNvPr id="50" name="직선 연결선 49"/>
+          <p:cNvCxnSpPr/>
+          <p:nvPr/>
+        </p:nvCxnSpPr>
+        <p:spPr>
+          <a:xfrm>
+            <a:off x="3860840" y="3776133"/>
+            <a:ext cx="516472" cy="0"/>
+          </a:xfrm>
+          <a:prstGeom prst="line">
+            <a:avLst/>
+          </a:prstGeom>
+          <a:ln w="28575"/>
+        </p:spPr>
+        <p:style>
+          <a:lnRef idx="1">
+            <a:schemeClr val="accent2"/>
+          </a:lnRef>
+          <a:fillRef idx="0">
+            <a:schemeClr val="accent2"/>
+          </a:fillRef>
+          <a:effectRef idx="0">
+            <a:schemeClr val="accent2"/>
+          </a:effectRef>
+          <a:fontRef idx="minor">
+            <a:schemeClr val="tx1"/>
+          </a:fontRef>
+        </p:style>
+      </p:cxnSp>
+      <p:sp>
+        <p:nvSpPr>
+          <p:cNvPr id="52" name="직사각형 51"/>
+          <p:cNvSpPr/>
+          <p:nvPr/>
+        </p:nvSpPr>
+        <p:spPr>
+          <a:xfrm>
+            <a:off x="6335750" y="1862993"/>
+            <a:ext cx="260566" cy="217585"/>
+          </a:xfrm>
+          <a:prstGeom prst="rect">
+            <a:avLst/>
+          </a:prstGeom>
+          <a:solidFill>
+            <a:srgbClr val="FF9E00"/>
+          </a:solidFill>
+          <a:ln>
+            <a:noFill/>
+          </a:ln>
+        </p:spPr>
+        <p:style>
+          <a:lnRef idx="2">
+            <a:schemeClr val="accent1">
+              <a:shade val="50000"/>
+            </a:schemeClr>
+          </a:lnRef>
+          <a:fillRef idx="1">
+            <a:schemeClr val="accent1"/>
+          </a:fillRef>
+          <a:effectRef idx="0">
+            <a:schemeClr val="accent1"/>
+          </a:effectRef>
+          <a:fontRef idx="minor">
+            <a:schemeClr val="lt1"/>
+          </a:fontRef>
+        </p:style>
+        <p:txBody>
+          <a:bodyPr rtlCol="0" anchor="ctr"/>
+          <a:lstStyle/>
+          <a:p>
+            <a:pPr algn="ctr"/>
+            <a:r>
+              <a:rPr lang="en-US" altLang="ko-KR" sz="1100" b="1" dirty="0"/>
+              <a:t>2</a:t>
+            </a:r>
+            <a:endParaRPr lang="ko-KR" altLang="en-US" sz="1100" b="1" dirty="0"/>
+          </a:p>
+        </p:txBody>
+      </p:sp>
+      <p:sp>
+        <p:nvSpPr>
+          <p:cNvPr id="53" name="직사각형 52"/>
+          <p:cNvSpPr/>
+          <p:nvPr/>
+        </p:nvSpPr>
+        <p:spPr>
+          <a:xfrm>
+            <a:off x="6496121" y="3557738"/>
+            <a:ext cx="260566" cy="217585"/>
+          </a:xfrm>
+          <a:prstGeom prst="rect">
+            <a:avLst/>
+          </a:prstGeom>
+          <a:solidFill>
+            <a:srgbClr val="FF9E00"/>
+          </a:solidFill>
+          <a:ln>
+            <a:noFill/>
+          </a:ln>
+        </p:spPr>
+        <p:style>
+          <a:lnRef idx="2">
+            <a:schemeClr val="accent1">
+              <a:shade val="50000"/>
+            </a:schemeClr>
+          </a:lnRef>
+          <a:fillRef idx="1">
+            <a:schemeClr val="accent1"/>
+          </a:fillRef>
+          <a:effectRef idx="0">
+            <a:schemeClr val="accent1"/>
+          </a:effectRef>
+          <a:fontRef idx="minor">
+            <a:schemeClr val="lt1"/>
+          </a:fontRef>
+        </p:style>
+        <p:txBody>
+          <a:bodyPr rtlCol="0" anchor="ctr"/>
+          <a:lstStyle/>
+          <a:p>
+            <a:pPr algn="ctr"/>
+            <a:r>
+              <a:rPr lang="en-US" altLang="ko-KR" sz="1100" b="1" dirty="0"/>
+              <a:t>4</a:t>
+            </a:r>
+            <a:endParaRPr lang="ko-KR" altLang="en-US" sz="1100" b="1" dirty="0"/>
+          </a:p>
+        </p:txBody>
+      </p:sp>
+      <p:grpSp>
+        <p:nvGrpSpPr>
+          <p:cNvPr id="54" name="그룹 53"/>
+          <p:cNvGrpSpPr/>
+          <p:nvPr/>
+        </p:nvGrpSpPr>
+        <p:grpSpPr>
+          <a:xfrm>
+            <a:off x="4353263" y="4034077"/>
+            <a:ext cx="1475117" cy="1966823"/>
+            <a:chOff x="6901132" y="4011283"/>
+            <a:chExt cx="1475117" cy="1966823"/>
+          </a:xfrm>
+        </p:grpSpPr>
+        <p:sp>
+          <p:nvSpPr>
+            <p:cNvPr id="55" name="직사각형 54"/>
+            <p:cNvSpPr/>
+            <p:nvPr/>
+          </p:nvSpPr>
+          <p:spPr>
+            <a:xfrm>
+              <a:off x="6901132" y="4011283"/>
+              <a:ext cx="1475117" cy="1966823"/>
+            </a:xfrm>
+            <a:prstGeom prst="rect">
+              <a:avLst/>
+            </a:prstGeom>
+            <a:solidFill>
+              <a:schemeClr val="bg1"/>
+            </a:solidFill>
+            <a:ln>
+              <a:solidFill>
+                <a:schemeClr val="bg1">
+                  <a:lumMod val="75000"/>
+                </a:schemeClr>
+              </a:solidFill>
+            </a:ln>
+          </p:spPr>
+          <p:style>
+            <a:lnRef idx="2">
+              <a:schemeClr val="accent1">
+                <a:shade val="50000"/>
+              </a:schemeClr>
+            </a:lnRef>
+            <a:fillRef idx="1">
+              <a:schemeClr val="accent1"/>
+            </a:fillRef>
+            <a:effectRef idx="0">
+              <a:schemeClr val="accent1"/>
+            </a:effectRef>
+            <a:fontRef idx="minor">
+              <a:schemeClr val="lt1"/>
+            </a:fontRef>
+          </p:style>
+          <p:txBody>
+            <a:bodyPr rtlCol="0" anchor="ctr"/>
+            <a:lstStyle/>
+            <a:p>
+              <a:pPr algn="ctr"/>
+              <a:endParaRPr lang="ko-KR" altLang="en-US" dirty="0">
+                <a:latin typeface="나눔바른고딕" panose="020B0603020101020101" pitchFamily="50" charset="-127"/>
+                <a:ea typeface="나눔바른고딕" panose="020B0603020101020101" pitchFamily="50" charset="-127"/>
+              </a:endParaRPr>
+            </a:p>
+          </p:txBody>
+        </p:sp>
+        <p:pic>
+          <p:nvPicPr>
+            <p:cNvPr id="56" name="Picture 2"/>
+            <p:cNvPicPr>
+              <a:picLocks noChangeAspect="1" noChangeArrowheads="1"/>
+            </p:cNvPicPr>
+            <p:nvPr/>
+          </p:nvPicPr>
+          <p:blipFill>
+            <a:blip r:embed="rId3">
+              <a:extLst>
+                <a:ext uri="{28A0092B-C50C-407E-A947-70E740481C1C}">
+                  <a14:useLocalDpi xmlns:a14="http://schemas.microsoft.com/office/drawing/2010/main" val="0"/>
+                </a:ext>
+              </a:extLst>
+            </a:blip>
+            <a:srcRect/>
+            <a:stretch>
+              <a:fillRect/>
+            </a:stretch>
+          </p:blipFill>
+          <p:spPr bwMode="auto">
+            <a:xfrm>
+              <a:off x="6901133" y="4017592"/>
+              <a:ext cx="1475116" cy="1227268"/>
+            </a:xfrm>
+            <a:prstGeom prst="rect">
+              <a:avLst/>
+            </a:prstGeom>
+            <a:noFill/>
+            <a:ln>
+              <a:noFill/>
+            </a:ln>
+            <a:effectLst/>
+            <a:extLst>
+              <a:ext uri="{909E8E84-426E-40DD-AFC4-6F175D3DCCD1}">
+                <a14:hiddenFill xmlns:a14="http://schemas.microsoft.com/office/drawing/2010/main">
+                  <a:solidFill>
+                    <a:schemeClr val="accent1"/>
+                  </a:solidFill>
+                </a14:hiddenFill>
+              </a:ext>
+              <a:ext uri="{91240B29-F687-4F45-9708-019B960494DF}">
+                <a14:hiddenLine xmlns:a14="http://schemas.microsoft.com/office/drawing/2010/main" w="9525">
+                  <a:solidFill>
+                    <a:schemeClr val="tx1"/>
+                  </a:solidFill>
+                  <a:miter lim="800000"/>
+                  <a:headEnd/>
+                  <a:tailEnd/>
+                </a14:hiddenLine>
+              </a:ext>
+              <a:ext uri="{AF507438-7753-43E0-B8FC-AC1667EBCBE1}">
+                <a14:hiddenEffects xmlns:a14="http://schemas.microsoft.com/office/drawing/2010/main">
+                  <a:effectLst>
+                    <a:outerShdw dist="35921" dir="2700000" algn="ctr" rotWithShape="0">
+                      <a:schemeClr val="bg2"/>
+                    </a:outerShdw>
+                  </a:effectLst>
+                </a14:hiddenEffects>
+              </a:ext>
+            </a:extLst>
+          </p:spPr>
+        </p:pic>
+        <p:sp>
+          <p:nvSpPr>
+            <p:cNvPr id="57" name="직사각형 56"/>
+            <p:cNvSpPr/>
+            <p:nvPr/>
+          </p:nvSpPr>
+          <p:spPr>
+            <a:xfrm>
+              <a:off x="6927011" y="5355745"/>
+              <a:ext cx="1388852" cy="165102"/>
+            </a:xfrm>
+            <a:prstGeom prst="rect">
+              <a:avLst/>
+            </a:prstGeom>
+            <a:solidFill>
+              <a:schemeClr val="bg1"/>
+            </a:solidFill>
+            <a:ln>
+              <a:solidFill>
+                <a:schemeClr val="bg1"/>
+              </a:solidFill>
+            </a:ln>
+          </p:spPr>
+          <p:style>
+            <a:lnRef idx="2">
+              <a:schemeClr val="accent1">
+                <a:shade val="50000"/>
+              </a:schemeClr>
+            </a:lnRef>
+            <a:fillRef idx="1">
+              <a:schemeClr val="accent1"/>
+            </a:fillRef>
+            <a:effectRef idx="0">
+              <a:schemeClr val="accent1"/>
+            </a:effectRef>
+            <a:fontRef idx="minor">
+              <a:schemeClr val="lt1"/>
+            </a:fontRef>
+          </p:style>
+          <p:txBody>
+            <a:bodyPr rtlCol="0" anchor="ctr"/>
+            <a:lstStyle/>
+            <a:p>
+              <a:pPr algn="just">
+                <a:lnSpc>
+                  <a:spcPts val="1000"/>
+                </a:lnSpc>
+              </a:pPr>
+              <a:r>
+                <a:rPr lang="en-US" altLang="ko-KR" sz="750" b="1" dirty="0">
+                  <a:solidFill>
+                    <a:schemeClr val="tx1"/>
+                  </a:solidFill>
+                  <a:latin typeface="나눔바른고딕" panose="020B0603020101020101" pitchFamily="50" charset="-127"/>
+                  <a:ea typeface="나눔바른고딕" panose="020B0603020101020101" pitchFamily="50" charset="-127"/>
+                </a:rPr>
+                <a:t>5</a:t>
+              </a:r>
+              <a:r>
+                <a:rPr lang="ko-KR" altLang="en-US" sz="750" b="1" dirty="0">
+                  <a:solidFill>
+                    <a:schemeClr val="tx1"/>
+                  </a:solidFill>
+                  <a:latin typeface="나눔바른고딕" panose="020B0603020101020101" pitchFamily="50" charset="-127"/>
+                  <a:ea typeface="나눔바른고딕" panose="020B0603020101020101" pitchFamily="50" charset="-127"/>
+                </a:rPr>
+                <a:t>만원대로 만나는 천연다이아몬드 팔찌</a:t>
+              </a:r>
+              <a:endParaRPr lang="en-US" altLang="ko-KR" sz="750" b="1" dirty="0">
+                <a:solidFill>
+                  <a:schemeClr val="tx1"/>
+                </a:solidFill>
+                <a:latin typeface="나눔바른고딕" panose="020B0603020101020101" pitchFamily="50" charset="-127"/>
+                <a:ea typeface="나눔바른고딕" panose="020B0603020101020101" pitchFamily="50" charset="-127"/>
+              </a:endParaRPr>
+            </a:p>
+          </p:txBody>
+        </p:sp>
+        <p:sp>
+          <p:nvSpPr>
+            <p:cNvPr id="58" name="직사각형 57"/>
+            <p:cNvSpPr/>
+            <p:nvPr/>
+          </p:nvSpPr>
+          <p:spPr>
+            <a:xfrm>
+              <a:off x="6927011" y="5597580"/>
+              <a:ext cx="414862" cy="137305"/>
+            </a:xfrm>
+            <a:prstGeom prst="rect">
+              <a:avLst/>
+            </a:prstGeom>
+            <a:solidFill>
+              <a:schemeClr val="bg1"/>
+            </a:solidFill>
+            <a:ln>
+              <a:solidFill>
+                <a:schemeClr val="bg1"/>
+              </a:solidFill>
+            </a:ln>
+          </p:spPr>
+          <p:style>
+            <a:lnRef idx="2">
+              <a:schemeClr val="accent1">
+                <a:shade val="50000"/>
+              </a:schemeClr>
+            </a:lnRef>
+            <a:fillRef idx="1">
+              <a:schemeClr val="accent1"/>
+            </a:fillRef>
+            <a:effectRef idx="0">
+              <a:schemeClr val="accent1"/>
+            </a:effectRef>
+            <a:fontRef idx="minor">
+              <a:schemeClr val="lt1"/>
+            </a:fontRef>
+          </p:style>
+          <p:txBody>
+            <a:bodyPr rtlCol="0" anchor="ctr"/>
+            <a:lstStyle/>
+            <a:p>
+              <a:r>
+                <a:rPr lang="ko-KR" altLang="en-US" sz="700" dirty="0">
+                  <a:solidFill>
+                    <a:schemeClr val="tx1">
+                      <a:lumMod val="65000"/>
+                      <a:lumOff val="35000"/>
+                    </a:schemeClr>
+                  </a:solidFill>
+                  <a:latin typeface="나눔바른고딕" panose="020B0603020101020101" pitchFamily="50" charset="-127"/>
+                  <a:ea typeface="나눔바른고딕" panose="020B0603020101020101" pitchFamily="50" charset="-127"/>
+                </a:rPr>
+                <a:t>이젠</a:t>
+              </a:r>
+            </a:p>
+          </p:txBody>
+        </p:sp>
+        <p:sp>
+          <p:nvSpPr>
+            <p:cNvPr id="59" name="직사각형 58"/>
+            <p:cNvSpPr/>
+            <p:nvPr/>
+          </p:nvSpPr>
+          <p:spPr>
+            <a:xfrm>
+              <a:off x="6927010" y="5849428"/>
+              <a:ext cx="586597" cy="68652"/>
+            </a:xfrm>
+            <a:prstGeom prst="rect">
+              <a:avLst/>
+            </a:prstGeom>
+            <a:solidFill>
+              <a:schemeClr val="bg1"/>
+            </a:solidFill>
+            <a:ln>
+              <a:solidFill>
+                <a:schemeClr val="bg1"/>
+              </a:solidFill>
+            </a:ln>
+          </p:spPr>
+          <p:style>
+            <a:lnRef idx="2">
+              <a:schemeClr val="accent1">
+                <a:shade val="50000"/>
+              </a:schemeClr>
+            </a:lnRef>
+            <a:fillRef idx="1">
+              <a:schemeClr val="accent1"/>
+            </a:fillRef>
+            <a:effectRef idx="0">
+              <a:schemeClr val="accent1"/>
+            </a:effectRef>
+            <a:fontRef idx="minor">
+              <a:schemeClr val="lt1"/>
+            </a:fontRef>
+          </p:style>
+          <p:txBody>
+            <a:bodyPr rtlCol="0" anchor="ctr"/>
+            <a:lstStyle/>
+            <a:p>
+              <a:r>
+                <a:rPr lang="ko-KR" altLang="en-US" sz="700" b="1" dirty="0">
+                  <a:solidFill>
+                    <a:schemeClr val="bg2">
+                      <a:lumMod val="50000"/>
+                    </a:schemeClr>
+                  </a:solidFill>
+                  <a:latin typeface="나눔바른고딕" panose="020B0603020101020101" pitchFamily="50" charset="-127"/>
+                  <a:ea typeface="나눔바른고딕" panose="020B0603020101020101" pitchFamily="50" charset="-127"/>
+                </a:rPr>
+                <a:t>패션 잡화</a:t>
+              </a:r>
+            </a:p>
+          </p:txBody>
+        </p:sp>
+        <p:sp>
+          <p:nvSpPr>
+            <p:cNvPr id="60" name="직사각형 59"/>
+            <p:cNvSpPr/>
+            <p:nvPr/>
+          </p:nvSpPr>
+          <p:spPr>
+            <a:xfrm>
+              <a:off x="7638691" y="5840802"/>
+              <a:ext cx="728933" cy="68652"/>
+            </a:xfrm>
+            <a:prstGeom prst="rect">
+              <a:avLst/>
+            </a:prstGeom>
+            <a:solidFill>
+              <a:schemeClr val="bg1"/>
+            </a:solidFill>
+            <a:ln>
+              <a:solidFill>
+                <a:schemeClr val="bg1"/>
+              </a:solidFill>
+            </a:ln>
+          </p:spPr>
+          <p:style>
+            <a:lnRef idx="2">
+              <a:schemeClr val="accent1">
+                <a:shade val="50000"/>
+              </a:schemeClr>
+            </a:lnRef>
+            <a:fillRef idx="1">
+              <a:schemeClr val="accent1"/>
+            </a:fillRef>
+            <a:effectRef idx="0">
+              <a:schemeClr val="accent1"/>
+            </a:effectRef>
+            <a:fontRef idx="minor">
+              <a:schemeClr val="lt1"/>
+            </a:fontRef>
+          </p:style>
+          <p:txBody>
+            <a:bodyPr rtlCol="0" anchor="ctr"/>
+            <a:lstStyle/>
+            <a:p>
+              <a:pPr algn="r"/>
+              <a:r>
+                <a:rPr lang="ko-KR" altLang="en-US" sz="700" b="1" dirty="0" err="1">
+                  <a:solidFill>
+                    <a:srgbClr val="FF9E00"/>
+                  </a:solidFill>
+                  <a:latin typeface="나눔바른고딕" panose="020B0603020101020101" pitchFamily="50" charset="-127"/>
+                  <a:ea typeface="나눔바른고딕" panose="020B0603020101020101" pitchFamily="50" charset="-127"/>
+                </a:rPr>
+                <a:t>모금률</a:t>
+              </a:r>
+              <a:r>
+                <a:rPr lang="en-US" altLang="ko-KR" sz="700" b="1" dirty="0">
+                  <a:solidFill>
+                    <a:srgbClr val="FF9E00"/>
+                  </a:solidFill>
+                  <a:latin typeface="나눔바른고딕" panose="020B0603020101020101" pitchFamily="50" charset="-127"/>
+                  <a:ea typeface="나눔바른고딕" panose="020B0603020101020101" pitchFamily="50" charset="-127"/>
+                </a:rPr>
+                <a:t> : 80%</a:t>
+              </a:r>
+              <a:endParaRPr lang="ko-KR" altLang="en-US" sz="700" b="1" dirty="0">
+                <a:solidFill>
+                  <a:srgbClr val="FF9E00"/>
+                </a:solidFill>
+                <a:latin typeface="나눔바른고딕" panose="020B0603020101020101" pitchFamily="50" charset="-127"/>
+                <a:ea typeface="나눔바른고딕" panose="020B0603020101020101" pitchFamily="50" charset="-127"/>
+              </a:endParaRPr>
+            </a:p>
+          </p:txBody>
+        </p:sp>
+      </p:grpSp>
+      <p:sp>
+        <p:nvSpPr>
+          <p:cNvPr id="61" name="직사각형 60"/>
+          <p:cNvSpPr/>
+          <p:nvPr/>
+        </p:nvSpPr>
+        <p:spPr>
+          <a:xfrm>
+            <a:off x="1963839" y="656678"/>
+            <a:ext cx="6592433" cy="484748"/>
+          </a:xfrm>
+          <a:prstGeom prst="rect">
+            <a:avLst/>
+          </a:prstGeom>
+        </p:spPr>
+        <p:txBody>
+          <a:bodyPr wrap="square" lIns="68580" tIns="34290" rIns="68580" bIns="34290">
+            <a:spAutoFit/>
+          </a:bodyPr>
+          <a:lstStyle/>
+          <a:p>
+            <a:pPr>
+              <a:lnSpc>
+                <a:spcPct val="150000"/>
+              </a:lnSpc>
+            </a:pPr>
+            <a:r>
+              <a:rPr lang="en-US" altLang="ko-KR" b="1" dirty="0">
+                <a:solidFill>
+                  <a:schemeClr val="tx1">
+                    <a:lumMod val="75000"/>
+                    <a:lumOff val="25000"/>
+                  </a:schemeClr>
+                </a:solidFill>
+                <a:latin typeface="나눔바른고딕" pitchFamily="50" charset="-127"/>
+                <a:ea typeface="나눔바른고딕" pitchFamily="50" charset="-127"/>
+              </a:rPr>
+              <a:t>[ </a:t>
+            </a:r>
+            <a:r>
+              <a:rPr lang="ko-KR" altLang="en-US" b="1" dirty="0">
+                <a:solidFill>
+                  <a:schemeClr val="tx1">
+                    <a:lumMod val="75000"/>
+                    <a:lumOff val="25000"/>
+                  </a:schemeClr>
+                </a:solidFill>
+                <a:latin typeface="나눔바른고딕" pitchFamily="50" charset="-127"/>
+                <a:ea typeface="나눔바른고딕" pitchFamily="50" charset="-127"/>
+              </a:rPr>
+              <a:t>화면설계 </a:t>
+            </a:r>
+            <a:r>
+              <a:rPr lang="en-US" altLang="ko-KR" b="1" dirty="0">
+                <a:solidFill>
+                  <a:schemeClr val="tx1">
+                    <a:lumMod val="75000"/>
+                    <a:lumOff val="25000"/>
+                  </a:schemeClr>
+                </a:solidFill>
+                <a:latin typeface="나눔바른고딕" pitchFamily="50" charset="-127"/>
+                <a:ea typeface="나눔바른고딕" pitchFamily="50" charset="-127"/>
+              </a:rPr>
+              <a:t>] </a:t>
+            </a:r>
+            <a:r>
+              <a:rPr lang="ko-KR" altLang="en-US" b="1" dirty="0">
+                <a:solidFill>
+                  <a:schemeClr val="tx1">
+                    <a:lumMod val="75000"/>
+                    <a:lumOff val="25000"/>
+                  </a:schemeClr>
+                </a:solidFill>
+                <a:latin typeface="나눔바른고딕" pitchFamily="50" charset="-127"/>
+                <a:ea typeface="나눔바른고딕" pitchFamily="50" charset="-127"/>
+              </a:rPr>
+              <a:t>관심프로젝트 </a:t>
+            </a:r>
+            <a:r>
+              <a:rPr lang="en-US" altLang="ko-KR" b="1" dirty="0">
+                <a:solidFill>
+                  <a:schemeClr val="tx1">
+                    <a:lumMod val="75000"/>
+                    <a:lumOff val="25000"/>
+                  </a:schemeClr>
+                </a:solidFill>
+                <a:latin typeface="나눔바른고딕" pitchFamily="50" charset="-127"/>
+                <a:ea typeface="나눔바른고딕" pitchFamily="50" charset="-127"/>
+              </a:rPr>
+              <a:t>– </a:t>
+            </a:r>
+            <a:r>
+              <a:rPr lang="ko-KR" altLang="en-US" b="1" dirty="0" err="1">
+                <a:solidFill>
+                  <a:schemeClr val="tx1">
+                    <a:lumMod val="75000"/>
+                    <a:lumOff val="25000"/>
+                  </a:schemeClr>
+                </a:solidFill>
+                <a:latin typeface="나눔바른고딕" pitchFamily="50" charset="-127"/>
+                <a:ea typeface="나눔바른고딕" pitchFamily="50" charset="-127"/>
+              </a:rPr>
+              <a:t>마이페이지</a:t>
+            </a:r>
+            <a:r>
+              <a:rPr lang="ko-KR" altLang="en-US" b="1" dirty="0">
+                <a:solidFill>
+                  <a:schemeClr val="tx1">
+                    <a:lumMod val="75000"/>
+                    <a:lumOff val="25000"/>
+                  </a:schemeClr>
+                </a:solidFill>
+                <a:latin typeface="나눔바른고딕" pitchFamily="50" charset="-127"/>
+                <a:ea typeface="나눔바른고딕" pitchFamily="50" charset="-127"/>
+              </a:rPr>
+              <a:t> </a:t>
+            </a:r>
+            <a:r>
+              <a:rPr lang="en-US" altLang="ko-KR" b="1" dirty="0">
+                <a:solidFill>
+                  <a:schemeClr val="tx1">
+                    <a:lumMod val="75000"/>
+                    <a:lumOff val="25000"/>
+                  </a:schemeClr>
+                </a:solidFill>
+                <a:latin typeface="나눔바른고딕" pitchFamily="50" charset="-127"/>
+                <a:ea typeface="나눔바른고딕" pitchFamily="50" charset="-127"/>
+              </a:rPr>
+              <a:t>- </a:t>
+            </a:r>
+            <a:r>
+              <a:rPr lang="ko-KR" altLang="en-US" b="1" dirty="0">
+                <a:solidFill>
+                  <a:schemeClr val="tx1">
+                    <a:lumMod val="75000"/>
+                    <a:lumOff val="25000"/>
+                  </a:schemeClr>
+                </a:solidFill>
+                <a:latin typeface="나눔바른고딕" pitchFamily="50" charset="-127"/>
+                <a:ea typeface="나눔바른고딕" pitchFamily="50" charset="-127"/>
+              </a:rPr>
+              <a:t>사용자</a:t>
+            </a:r>
+          </a:p>
+        </p:txBody>
+      </p:sp>
+      <p:pic>
+        <p:nvPicPr>
+          <p:cNvPr id="62" name="Picture 2"/>
+          <p:cNvPicPr>
+            <a:picLocks noChangeAspect="1" noChangeArrowheads="1"/>
+          </p:cNvPicPr>
+          <p:nvPr/>
+        </p:nvPicPr>
+        <p:blipFill>
+          <a:blip r:embed="rId4" cstate="print">
+            <a:extLst>
+              <a:ext uri="{28A0092B-C50C-407E-A947-70E740481C1C}">
+                <a14:useLocalDpi xmlns:a14="http://schemas.microsoft.com/office/drawing/2010/main" val="0"/>
+              </a:ext>
+            </a:extLst>
+          </a:blip>
+          <a:srcRect/>
+          <a:stretch>
+            <a:fillRect/>
+          </a:stretch>
+        </p:blipFill>
+        <p:spPr bwMode="auto">
+          <a:xfrm>
+            <a:off x="1081171" y="576758"/>
+            <a:ext cx="863854" cy="575340"/>
+          </a:xfrm>
+          <a:prstGeom prst="rect">
+            <a:avLst/>
+          </a:prstGeom>
+          <a:noFill/>
+          <a:ln>
+            <a:noFill/>
+          </a:ln>
+          <a:extLst>
+            <a:ext uri="{909E8E84-426E-40DD-AFC4-6F175D3DCCD1}">
+              <a14:hiddenFill xmlns:a14="http://schemas.microsoft.com/office/drawing/2010/main">
+                <a:solidFill>
+                  <a:schemeClr val="accent1"/>
+                </a:solidFill>
+              </a14:hiddenFill>
+            </a:ext>
+            <a:ext uri="{91240B29-F687-4F45-9708-019B960494DF}">
+              <a14:hiddenLine xmlns:a14="http://schemas.microsoft.com/office/drawing/2010/main" w="9525">
+                <a:solidFill>
+                  <a:schemeClr val="tx1"/>
+                </a:solidFill>
+                <a:miter lim="800000"/>
+                <a:headEnd/>
+                <a:tailEnd/>
+              </a14:hiddenLine>
+            </a:ext>
+          </a:extLst>
+        </p:spPr>
+      </p:pic>
+    </p:spTree>
+    <p:extLst>
+      <p:ext uri="{BB962C8B-B14F-4D97-AF65-F5344CB8AC3E}">
+        <p14:creationId xmlns:p14="http://schemas.microsoft.com/office/powerpoint/2010/main" val="973390298"/>
+      </p:ext>
+    </p:extLst>
+  </p:cSld>
+  <p:clrMapOvr>
+    <a:masterClrMapping/>
+  </p:clrMapOvr>
+</p:sld>
+</file>
+
+<file path=ppt/slides/slide16.xml><?xml version="1.0" encoding="utf-8"?>
+<p:sld xmlns:a="http://schemas.openxmlformats.org/drawingml/2006/main" xmlns:r="http://schemas.openxmlformats.org/officeDocument/2006/relationships" xmlns:p="http://schemas.openxmlformats.org/presentationml/2006/main">
+  <p:cSld>
+    <p:spTree>
+      <p:nvGrpSpPr>
+        <p:cNvPr id="1" name=""/>
+        <p:cNvGrpSpPr/>
+        <p:nvPr/>
+      </p:nvGrpSpPr>
+      <p:grpSpPr>
+        <a:xfrm>
+          <a:off x="0" y="0"/>
+          <a:ext cx="0" cy="0"/>
+          <a:chOff x="0" y="0"/>
+          <a:chExt cx="0" cy="0"/>
+        </a:xfrm>
+      </p:grpSpPr>
+      <p:sp>
+        <p:nvSpPr>
+          <p:cNvPr id="6" name="양쪽 모서리가 둥근 사각형 5"/>
+          <p:cNvSpPr/>
+          <p:nvPr/>
+        </p:nvSpPr>
+        <p:spPr>
+          <a:xfrm>
+            <a:off x="143339" y="548680"/>
+            <a:ext cx="11905323" cy="6144683"/>
+          </a:xfrm>
+          <a:prstGeom prst="round2SameRect">
+            <a:avLst>
+              <a:gd name="adj1" fmla="val 0"/>
+              <a:gd name="adj2" fmla="val 2405"/>
+            </a:avLst>
+          </a:prstGeom>
+          <a:solidFill>
+            <a:schemeClr val="bg1"/>
+          </a:solidFill>
+          <a:ln>
+            <a:noFill/>
+          </a:ln>
+          <a:effectLst>
+            <a:outerShdw dist="254000" dir="5400000" sx="97000" sy="97000" algn="t" rotWithShape="0">
+              <a:prstClr val="black">
+                <a:alpha val="40000"/>
+              </a:prstClr>
+            </a:outerShdw>
+          </a:effectLst>
+        </p:spPr>
+        <p:style>
+          <a:lnRef idx="2">
+            <a:schemeClr val="accent1">
+              <a:shade val="50000"/>
+            </a:schemeClr>
+          </a:lnRef>
+          <a:fillRef idx="1">
+            <a:schemeClr val="accent1"/>
+          </a:fillRef>
+          <a:effectRef idx="0">
+            <a:schemeClr val="accent1"/>
+          </a:effectRef>
+          <a:fontRef idx="minor">
+            <a:schemeClr val="lt1"/>
+          </a:fontRef>
+        </p:style>
+        <p:txBody>
+          <a:bodyPr lIns="91438" tIns="45719" rIns="91438" bIns="45719" rtlCol="0" anchor="ctr"/>
+          <a:lstStyle/>
+          <a:p>
+            <a:pPr algn="ctr"/>
+            <a:endParaRPr lang="ko-KR" altLang="en-US">
+              <a:solidFill>
+                <a:prstClr val="white"/>
+              </a:solidFill>
+            </a:endParaRPr>
+          </a:p>
+        </p:txBody>
+      </p:sp>
+      <p:sp>
+        <p:nvSpPr>
+          <p:cNvPr id="5" name="양쪽 모서리가 둥근 사각형 4"/>
+          <p:cNvSpPr/>
+          <p:nvPr/>
+        </p:nvSpPr>
+        <p:spPr>
+          <a:xfrm>
+            <a:off x="143339" y="243880"/>
+            <a:ext cx="11905323" cy="304800"/>
+          </a:xfrm>
+          <a:prstGeom prst="round2SameRect">
+            <a:avLst>
+              <a:gd name="adj1" fmla="val 44667"/>
+              <a:gd name="adj2" fmla="val 0"/>
+            </a:avLst>
+          </a:prstGeom>
+          <a:solidFill>
+            <a:srgbClr val="411F42"/>
+          </a:solidFill>
+          <a:ln>
+            <a:noFill/>
+          </a:ln>
+          <a:effectLst>
+            <a:outerShdw dist="76200" dir="16200000" sx="97000" sy="97000" rotWithShape="0">
+              <a:prstClr val="black">
+                <a:alpha val="40000"/>
+              </a:prstClr>
+            </a:outerShdw>
+          </a:effectLst>
+        </p:spPr>
+        <p:style>
+          <a:lnRef idx="2">
+            <a:schemeClr val="accent1">
+              <a:shade val="50000"/>
+            </a:schemeClr>
+          </a:lnRef>
+          <a:fillRef idx="1">
+            <a:schemeClr val="accent1"/>
+          </a:fillRef>
+          <a:effectRef idx="0">
+            <a:schemeClr val="accent1"/>
+          </a:effectRef>
+          <a:fontRef idx="minor">
+            <a:schemeClr val="lt1"/>
+          </a:fontRef>
+        </p:style>
+        <p:txBody>
+          <a:bodyPr lIns="91438" tIns="45719" rIns="91438" bIns="45719" rtlCol="0" anchor="ctr"/>
+          <a:lstStyle/>
+          <a:p>
+            <a:pPr algn="ctr"/>
+            <a:endParaRPr lang="ko-KR" altLang="en-US">
+              <a:solidFill>
+                <a:prstClr val="white"/>
+              </a:solidFill>
+            </a:endParaRPr>
+          </a:p>
+        </p:txBody>
+      </p:sp>
+      <p:sp>
+        <p:nvSpPr>
+          <p:cNvPr id="7" name="직사각형 6"/>
+          <p:cNvSpPr/>
+          <p:nvPr/>
+        </p:nvSpPr>
+        <p:spPr>
+          <a:xfrm>
+            <a:off x="935120" y="366664"/>
+            <a:ext cx="10613801" cy="72000"/>
+          </a:xfrm>
+          <a:prstGeom prst="rect">
+            <a:avLst/>
+          </a:prstGeom>
+          <a:solidFill>
+            <a:schemeClr val="bg1"/>
+          </a:solidFill>
+          <a:ln>
+            <a:noFill/>
+          </a:ln>
+        </p:spPr>
+        <p:style>
+          <a:lnRef idx="2">
+            <a:schemeClr val="accent1">
+              <a:shade val="50000"/>
+            </a:schemeClr>
+          </a:lnRef>
+          <a:fillRef idx="1">
+            <a:schemeClr val="accent1"/>
+          </a:fillRef>
+          <a:effectRef idx="0">
+            <a:schemeClr val="accent1"/>
+          </a:effectRef>
+          <a:fontRef idx="minor">
+            <a:schemeClr val="lt1"/>
+          </a:fontRef>
+        </p:style>
+        <p:txBody>
+          <a:bodyPr lIns="91438" tIns="45719" rIns="91438" bIns="45719" rtlCol="0" anchor="ctr"/>
+          <a:lstStyle/>
+          <a:p>
+            <a:pPr algn="ctr"/>
+            <a:endParaRPr lang="ko-KR" altLang="en-US">
+              <a:solidFill>
+                <a:prstClr val="white"/>
+              </a:solidFill>
+            </a:endParaRPr>
+          </a:p>
+        </p:txBody>
+      </p:sp>
+      <p:sp>
+        <p:nvSpPr>
+          <p:cNvPr id="8" name="타원 7"/>
+          <p:cNvSpPr/>
+          <p:nvPr/>
+        </p:nvSpPr>
+        <p:spPr>
+          <a:xfrm>
+            <a:off x="576949" y="366664"/>
+            <a:ext cx="75276" cy="72000"/>
+          </a:xfrm>
+          <a:prstGeom prst="ellipse">
+            <a:avLst/>
+          </a:prstGeom>
+          <a:solidFill>
+            <a:srgbClr val="FF6189"/>
+          </a:solidFill>
+          <a:ln>
+            <a:noFill/>
+          </a:ln>
+        </p:spPr>
+        <p:style>
+          <a:lnRef idx="2">
+            <a:schemeClr val="accent1">
+              <a:shade val="50000"/>
+            </a:schemeClr>
+          </a:lnRef>
+          <a:fillRef idx="1">
+            <a:schemeClr val="accent1"/>
+          </a:fillRef>
+          <a:effectRef idx="0">
+            <a:schemeClr val="accent1"/>
+          </a:effectRef>
+          <a:fontRef idx="minor">
+            <a:schemeClr val="lt1"/>
+          </a:fontRef>
+        </p:style>
+        <p:txBody>
+          <a:bodyPr lIns="91438" tIns="45719" rIns="91438" bIns="45719" rtlCol="0" anchor="ctr"/>
+          <a:lstStyle/>
+          <a:p>
+            <a:pPr algn="ctr"/>
+            <a:endParaRPr lang="ko-KR" altLang="en-US">
+              <a:solidFill>
+                <a:prstClr val="white"/>
+              </a:solidFill>
+            </a:endParaRPr>
+          </a:p>
+        </p:txBody>
+      </p:sp>
+      <p:sp>
+        <p:nvSpPr>
+          <p:cNvPr id="9" name="타원 8"/>
+          <p:cNvSpPr/>
+          <p:nvPr/>
+        </p:nvSpPr>
+        <p:spPr>
+          <a:xfrm>
+            <a:off x="766826" y="366664"/>
+            <a:ext cx="75276" cy="72000"/>
+          </a:xfrm>
+          <a:prstGeom prst="ellipse">
+            <a:avLst/>
+          </a:prstGeom>
+          <a:solidFill>
+            <a:srgbClr val="00B0F0"/>
+          </a:solidFill>
+          <a:ln>
+            <a:noFill/>
+          </a:ln>
+        </p:spPr>
+        <p:style>
+          <a:lnRef idx="2">
+            <a:schemeClr val="accent1">
+              <a:shade val="50000"/>
+            </a:schemeClr>
+          </a:lnRef>
+          <a:fillRef idx="1">
+            <a:schemeClr val="accent1"/>
+          </a:fillRef>
+          <a:effectRef idx="0">
+            <a:schemeClr val="accent1"/>
+          </a:effectRef>
+          <a:fontRef idx="minor">
+            <a:schemeClr val="lt1"/>
+          </a:fontRef>
+        </p:style>
+        <p:txBody>
+          <a:bodyPr lIns="91438" tIns="45719" rIns="91438" bIns="45719" rtlCol="0" anchor="ctr"/>
+          <a:lstStyle/>
+          <a:p>
+            <a:pPr algn="ctr"/>
+            <a:endParaRPr lang="ko-KR" altLang="en-US">
+              <a:solidFill>
+                <a:prstClr val="white"/>
+              </a:solidFill>
+            </a:endParaRPr>
+          </a:p>
+        </p:txBody>
+      </p:sp>
+      <p:sp>
+        <p:nvSpPr>
+          <p:cNvPr id="10" name="타원 9"/>
+          <p:cNvSpPr/>
+          <p:nvPr/>
+        </p:nvSpPr>
+        <p:spPr>
+          <a:xfrm>
+            <a:off x="956703" y="366664"/>
+            <a:ext cx="75276" cy="72000"/>
+          </a:xfrm>
+          <a:prstGeom prst="ellipse">
+            <a:avLst/>
+          </a:prstGeom>
+          <a:solidFill>
+            <a:schemeClr val="accent4"/>
+          </a:solidFill>
+          <a:ln>
+            <a:noFill/>
+          </a:ln>
+        </p:spPr>
+        <p:style>
+          <a:lnRef idx="2">
+            <a:schemeClr val="accent1">
+              <a:shade val="50000"/>
+            </a:schemeClr>
+          </a:lnRef>
+          <a:fillRef idx="1">
+            <a:schemeClr val="accent1"/>
+          </a:fillRef>
+          <a:effectRef idx="0">
+            <a:schemeClr val="accent1"/>
+          </a:effectRef>
+          <a:fontRef idx="minor">
+            <a:schemeClr val="lt1"/>
+          </a:fontRef>
+        </p:style>
+        <p:txBody>
+          <a:bodyPr lIns="91438" tIns="45719" rIns="91438" bIns="45719" rtlCol="0" anchor="ctr"/>
+          <a:lstStyle/>
+          <a:p>
+            <a:pPr algn="ctr"/>
+            <a:endParaRPr lang="ko-KR" altLang="en-US">
+              <a:solidFill>
+                <a:prstClr val="white"/>
+              </a:solidFill>
+            </a:endParaRPr>
+          </a:p>
+        </p:txBody>
+      </p:sp>
+      <p:sp>
+        <p:nvSpPr>
+          <p:cNvPr id="12" name="직사각형 11"/>
+          <p:cNvSpPr/>
+          <p:nvPr/>
+        </p:nvSpPr>
+        <p:spPr>
+          <a:xfrm>
+            <a:off x="614586" y="626201"/>
+            <a:ext cx="8789911" cy="646331"/>
+          </a:xfrm>
+          <a:prstGeom prst="rect">
+            <a:avLst/>
+          </a:prstGeom>
+        </p:spPr>
+        <p:txBody>
+          <a:bodyPr wrap="square" lIns="91438" tIns="45719" rIns="91438" bIns="45719">
+            <a:spAutoFit/>
+          </a:bodyPr>
+          <a:lstStyle/>
+          <a:p>
+            <a:pPr>
+              <a:lnSpc>
+                <a:spcPct val="150000"/>
+              </a:lnSpc>
+            </a:pPr>
+            <a:r>
+              <a:rPr lang="en-US" altLang="ko-KR" sz="2400" b="1" dirty="0">
+                <a:solidFill>
+                  <a:schemeClr val="tx1">
+                    <a:lumMod val="75000"/>
+                    <a:lumOff val="25000"/>
+                  </a:schemeClr>
+                </a:solidFill>
+                <a:latin typeface="+mj-ea"/>
+                <a:ea typeface="+mj-ea"/>
+              </a:rPr>
+              <a:t>[ </a:t>
+            </a:r>
+            <a:r>
+              <a:rPr lang="ko-KR" altLang="en-US" sz="2400" b="1" dirty="0">
+                <a:solidFill>
+                  <a:schemeClr val="tx1">
+                    <a:lumMod val="75000"/>
+                    <a:lumOff val="25000"/>
+                  </a:schemeClr>
+                </a:solidFill>
+                <a:latin typeface="+mj-ea"/>
+                <a:ea typeface="+mj-ea"/>
+              </a:rPr>
+              <a:t>화면구현 </a:t>
+            </a:r>
+            <a:r>
+              <a:rPr lang="en-US" altLang="ko-KR" sz="2400" b="1" dirty="0">
+                <a:solidFill>
+                  <a:schemeClr val="tx1">
+                    <a:lumMod val="75000"/>
+                    <a:lumOff val="25000"/>
+                  </a:schemeClr>
+                </a:solidFill>
+                <a:latin typeface="+mj-ea"/>
+                <a:ea typeface="+mj-ea"/>
+              </a:rPr>
+              <a:t>] </a:t>
+            </a:r>
+            <a:r>
+              <a:rPr lang="ko-KR" altLang="en-US" sz="2400" b="1" dirty="0">
+                <a:solidFill>
+                  <a:schemeClr val="tx1">
+                    <a:lumMod val="75000"/>
+                    <a:lumOff val="25000"/>
+                  </a:schemeClr>
+                </a:solidFill>
+                <a:latin typeface="+mj-ea"/>
+              </a:rPr>
+              <a:t>관심프로젝트 </a:t>
+            </a:r>
+            <a:r>
+              <a:rPr lang="en-US" altLang="ko-KR" sz="2400" b="1" dirty="0">
+                <a:solidFill>
+                  <a:schemeClr val="tx1">
+                    <a:lumMod val="75000"/>
+                    <a:lumOff val="25000"/>
+                  </a:schemeClr>
+                </a:solidFill>
+                <a:latin typeface="+mj-ea"/>
+              </a:rPr>
+              <a:t>– </a:t>
+            </a:r>
+            <a:r>
+              <a:rPr lang="ko-KR" altLang="en-US" sz="2400" b="1" dirty="0" err="1">
+                <a:solidFill>
+                  <a:schemeClr val="tx1">
+                    <a:lumMod val="75000"/>
+                    <a:lumOff val="25000"/>
+                  </a:schemeClr>
+                </a:solidFill>
+                <a:latin typeface="+mj-ea"/>
+              </a:rPr>
+              <a:t>마이페이지</a:t>
+            </a:r>
+            <a:r>
+              <a:rPr lang="ko-KR" altLang="en-US" sz="2400" b="1" dirty="0">
+                <a:solidFill>
+                  <a:schemeClr val="tx1">
+                    <a:lumMod val="75000"/>
+                    <a:lumOff val="25000"/>
+                  </a:schemeClr>
+                </a:solidFill>
+                <a:latin typeface="+mj-ea"/>
+              </a:rPr>
+              <a:t> </a:t>
+            </a:r>
+            <a:r>
+              <a:rPr lang="en-US" altLang="ko-KR" sz="2400" b="1" dirty="0">
+                <a:solidFill>
+                  <a:schemeClr val="tx1">
+                    <a:lumMod val="75000"/>
+                    <a:lumOff val="25000"/>
+                  </a:schemeClr>
+                </a:solidFill>
+                <a:latin typeface="+mj-ea"/>
+              </a:rPr>
+              <a:t>- </a:t>
+            </a:r>
+            <a:r>
+              <a:rPr lang="ko-KR" altLang="en-US" sz="2400" b="1" dirty="0">
+                <a:solidFill>
+                  <a:schemeClr val="tx1">
+                    <a:lumMod val="75000"/>
+                    <a:lumOff val="25000"/>
+                  </a:schemeClr>
+                </a:solidFill>
+                <a:latin typeface="+mj-ea"/>
+              </a:rPr>
+              <a:t>사용자</a:t>
+            </a:r>
+            <a:endParaRPr lang="ko-KR" altLang="en-US" sz="2400" b="1" dirty="0">
+              <a:solidFill>
+                <a:schemeClr val="tx1">
+                  <a:lumMod val="75000"/>
+                  <a:lumOff val="25000"/>
+                </a:schemeClr>
+              </a:solidFill>
+              <a:latin typeface="+mj-ea"/>
+              <a:ea typeface="+mj-ea"/>
+            </a:endParaRPr>
+          </a:p>
+        </p:txBody>
+      </p:sp>
+      <p:pic>
+        <p:nvPicPr>
+          <p:cNvPr id="1026" name="Picture 2"/>
+          <p:cNvPicPr>
+            <a:picLocks noChangeAspect="1" noChangeArrowheads="1"/>
+          </p:cNvPicPr>
+          <p:nvPr/>
+        </p:nvPicPr>
+        <p:blipFill>
+          <a:blip r:embed="rId2">
+            <a:extLst>
+              <a:ext uri="{28A0092B-C50C-407E-A947-70E740481C1C}">
+                <a14:useLocalDpi xmlns:a14="http://schemas.microsoft.com/office/drawing/2010/main" val="0"/>
+              </a:ext>
+            </a:extLst>
+          </a:blip>
+          <a:srcRect/>
+          <a:stretch>
+            <a:fillRect/>
+          </a:stretch>
+        </p:blipFill>
+        <p:spPr bwMode="auto">
+          <a:xfrm>
+            <a:off x="4554729" y="1346200"/>
+            <a:ext cx="2823031" cy="5057548"/>
+          </a:xfrm>
+          <a:prstGeom prst="rect">
+            <a:avLst/>
+          </a:prstGeom>
+          <a:noFill/>
+          <a:ln w="9525">
+            <a:solidFill>
+              <a:schemeClr val="tx1"/>
+            </a:solidFill>
+            <a:miter lim="800000"/>
+            <a:headEnd/>
+            <a:tailEnd/>
+          </a:ln>
+          <a:effectLst/>
+          <a:extLst>
+            <a:ext uri="{909E8E84-426E-40DD-AFC4-6F175D3DCCD1}">
+              <a14:hiddenFill xmlns:a14="http://schemas.microsoft.com/office/drawing/2010/main">
+                <a:solidFill>
+                  <a:schemeClr val="accent1"/>
+                </a:solidFill>
+              </a14:hiddenFill>
+            </a:ext>
+            <a:ext uri="{AF507438-7753-43E0-B8FC-AC1667EBCBE1}">
+              <a14:hiddenEffects xmlns:a14="http://schemas.microsoft.com/office/drawing/2010/main">
+                <a:effectLst>
+                  <a:outerShdw dist="35921" dir="2700000" algn="ctr" rotWithShape="0">
+                    <a:schemeClr val="bg2"/>
+                  </a:outerShdw>
+                </a:effectLst>
+              </a14:hiddenEffects>
+            </a:ext>
+          </a:extLst>
+        </p:spPr>
+      </p:pic>
+    </p:spTree>
+    <p:extLst>
+      <p:ext uri="{BB962C8B-B14F-4D97-AF65-F5344CB8AC3E}">
+        <p14:creationId xmlns:p14="http://schemas.microsoft.com/office/powerpoint/2010/main" val="1812746793"/>
       </p:ext>
     </p:extLst>
   </p:cSld>
@@ -19367,7 +23254,7 @@
                 <a:gridCol w="2688299">
                   <a:extLst>
                     <a:ext uri="{9D8B030D-6E8A-4147-A177-3AD203B41FA5}">
-                      <a16:colId xmlns="" xmlns:a16="http://schemas.microsoft.com/office/drawing/2014/main" val="20000"/>
+                      <a16:colId xmlns:a16="http://schemas.microsoft.com/office/drawing/2014/main" xmlns="" val="20000"/>
                     </a:ext>
                   </a:extLst>
                 </a:gridCol>
@@ -19399,7 +23286,7 @@
                 </a:tc>
                 <a:extLst>
                   <a:ext uri="{0D108BD9-81ED-4DB2-BD59-A6C34878D82A}">
-                    <a16:rowId xmlns="" xmlns:a16="http://schemas.microsoft.com/office/drawing/2014/main" val="10000"/>
+                    <a16:rowId xmlns:a16="http://schemas.microsoft.com/office/drawing/2014/main" xmlns="" val="10000"/>
                   </a:ext>
                 </a:extLst>
               </a:tr>
@@ -19427,7 +23314,7 @@
                 </a:tc>
                 <a:extLst>
                   <a:ext uri="{0D108BD9-81ED-4DB2-BD59-A6C34878D82A}">
-                    <a16:rowId xmlns="" xmlns:a16="http://schemas.microsoft.com/office/drawing/2014/main" val="10001"/>
+                    <a16:rowId xmlns:a16="http://schemas.microsoft.com/office/drawing/2014/main" xmlns="" val="10001"/>
                   </a:ext>
                 </a:extLst>
               </a:tr>
@@ -19461,14 +23348,14 @@
                 <a:gridCol w="280507">
                   <a:extLst>
                     <a:ext uri="{9D8B030D-6E8A-4147-A177-3AD203B41FA5}">
-                      <a16:colId xmlns="" xmlns:a16="http://schemas.microsoft.com/office/drawing/2014/main" val="20000"/>
+                      <a16:colId xmlns:a16="http://schemas.microsoft.com/office/drawing/2014/main" xmlns="" val="20000"/>
                     </a:ext>
                   </a:extLst>
                 </a:gridCol>
                 <a:gridCol w="2407792">
                   <a:extLst>
                     <a:ext uri="{9D8B030D-6E8A-4147-A177-3AD203B41FA5}">
-                      <a16:colId xmlns="" xmlns:a16="http://schemas.microsoft.com/office/drawing/2014/main" val="20001"/>
+                      <a16:colId xmlns:a16="http://schemas.microsoft.com/office/drawing/2014/main" xmlns="" val="20001"/>
                     </a:ext>
                   </a:extLst>
                 </a:gridCol>
@@ -19530,7 +23417,7 @@
                 </a:tc>
                 <a:extLst>
                   <a:ext uri="{0D108BD9-81ED-4DB2-BD59-A6C34878D82A}">
-                    <a16:rowId xmlns="" xmlns:a16="http://schemas.microsoft.com/office/drawing/2014/main" val="10000"/>
+                    <a16:rowId xmlns:a16="http://schemas.microsoft.com/office/drawing/2014/main" xmlns="" val="10000"/>
                   </a:ext>
                 </a:extLst>
               </a:tr>
@@ -19622,7 +23509,7 @@
                 </a:tc>
                 <a:extLst>
                   <a:ext uri="{0D108BD9-81ED-4DB2-BD59-A6C34878D82A}">
-                    <a16:rowId xmlns="" xmlns:a16="http://schemas.microsoft.com/office/drawing/2014/main" val="10001"/>
+                    <a16:rowId xmlns:a16="http://schemas.microsoft.com/office/drawing/2014/main" xmlns="" val="10001"/>
                   </a:ext>
                 </a:extLst>
               </a:tr>
@@ -19732,7 +23619,7 @@
                 </a:tc>
                 <a:extLst>
                   <a:ext uri="{0D108BD9-81ED-4DB2-BD59-A6C34878D82A}">
-                    <a16:rowId xmlns="" xmlns:a16="http://schemas.microsoft.com/office/drawing/2014/main" val="10002"/>
+                    <a16:rowId xmlns:a16="http://schemas.microsoft.com/office/drawing/2014/main" xmlns="" val="10002"/>
                   </a:ext>
                 </a:extLst>
               </a:tr>
@@ -19857,7 +23744,7 @@
                 </a:tc>
                 <a:extLst>
                   <a:ext uri="{0D108BD9-81ED-4DB2-BD59-A6C34878D82A}">
-                    <a16:rowId xmlns="" xmlns:a16="http://schemas.microsoft.com/office/drawing/2014/main" val="10003"/>
+                    <a16:rowId xmlns:a16="http://schemas.microsoft.com/office/drawing/2014/main" xmlns="" val="10003"/>
                   </a:ext>
                 </a:extLst>
               </a:tr>
@@ -20027,7 +23914,7 @@
                 </a:tc>
                 <a:extLst>
                   <a:ext uri="{0D108BD9-81ED-4DB2-BD59-A6C34878D82A}">
-                    <a16:rowId xmlns="" xmlns:a16="http://schemas.microsoft.com/office/drawing/2014/main" val="10004"/>
+                    <a16:rowId xmlns:a16="http://schemas.microsoft.com/office/drawing/2014/main" xmlns="" val="10004"/>
                   </a:ext>
                 </a:extLst>
               </a:tr>
@@ -23078,7 +26965,7 @@
                 <a:gridCol w="2692879">
                   <a:extLst>
                     <a:ext uri="{9D8B030D-6E8A-4147-A177-3AD203B41FA5}">
-                      <a16:colId xmlns="" xmlns:a16="http://schemas.microsoft.com/office/drawing/2014/main" val="20000"/>
+                      <a16:colId xmlns:a16="http://schemas.microsoft.com/office/drawing/2014/main" xmlns="" val="20000"/>
                     </a:ext>
                   </a:extLst>
                 </a:gridCol>
@@ -23110,7 +26997,7 @@
                 </a:tc>
                 <a:extLst>
                   <a:ext uri="{0D108BD9-81ED-4DB2-BD59-A6C34878D82A}">
-                    <a16:rowId xmlns="" xmlns:a16="http://schemas.microsoft.com/office/drawing/2014/main" val="10000"/>
+                    <a16:rowId xmlns:a16="http://schemas.microsoft.com/office/drawing/2014/main" xmlns="" val="10000"/>
                   </a:ext>
                 </a:extLst>
               </a:tr>
@@ -23138,7 +27025,7 @@
                 </a:tc>
                 <a:extLst>
                   <a:ext uri="{0D108BD9-81ED-4DB2-BD59-A6C34878D82A}">
-                    <a16:rowId xmlns="" xmlns:a16="http://schemas.microsoft.com/office/drawing/2014/main" val="10001"/>
+                    <a16:rowId xmlns:a16="http://schemas.microsoft.com/office/drawing/2014/main" xmlns="" val="10001"/>
                   </a:ext>
                 </a:extLst>
               </a:tr>
@@ -25155,14 +29042,14 @@
                 <a:gridCol w="280507">
                   <a:extLst>
                     <a:ext uri="{9D8B030D-6E8A-4147-A177-3AD203B41FA5}">
-                      <a16:colId xmlns="" xmlns:a16="http://schemas.microsoft.com/office/drawing/2014/main" val="20000"/>
+                      <a16:colId xmlns:a16="http://schemas.microsoft.com/office/drawing/2014/main" xmlns="" val="20000"/>
                     </a:ext>
                   </a:extLst>
                 </a:gridCol>
                 <a:gridCol w="2407792">
                   <a:extLst>
                     <a:ext uri="{9D8B030D-6E8A-4147-A177-3AD203B41FA5}">
-                      <a16:colId xmlns="" xmlns:a16="http://schemas.microsoft.com/office/drawing/2014/main" val="20001"/>
+                      <a16:colId xmlns:a16="http://schemas.microsoft.com/office/drawing/2014/main" xmlns="" val="20001"/>
                     </a:ext>
                   </a:extLst>
                 </a:gridCol>
@@ -25224,7 +29111,7 @@
                 </a:tc>
                 <a:extLst>
                   <a:ext uri="{0D108BD9-81ED-4DB2-BD59-A6C34878D82A}">
-                    <a16:rowId xmlns="" xmlns:a16="http://schemas.microsoft.com/office/drawing/2014/main" val="10000"/>
+                    <a16:rowId xmlns:a16="http://schemas.microsoft.com/office/drawing/2014/main" xmlns="" val="10000"/>
                   </a:ext>
                 </a:extLst>
               </a:tr>
@@ -25334,7 +29221,7 @@
                 </a:tc>
                 <a:extLst>
                   <a:ext uri="{0D108BD9-81ED-4DB2-BD59-A6C34878D82A}">
-                    <a16:rowId xmlns="" xmlns:a16="http://schemas.microsoft.com/office/drawing/2014/main" val="10001"/>
+                    <a16:rowId xmlns:a16="http://schemas.microsoft.com/office/drawing/2014/main" xmlns="" val="10001"/>
                   </a:ext>
                 </a:extLst>
               </a:tr>
@@ -25536,7 +29423,7 @@
                 </a:tc>
                 <a:extLst>
                   <a:ext uri="{0D108BD9-81ED-4DB2-BD59-A6C34878D82A}">
-                    <a16:rowId xmlns="" xmlns:a16="http://schemas.microsoft.com/office/drawing/2014/main" val="10002"/>
+                    <a16:rowId xmlns:a16="http://schemas.microsoft.com/office/drawing/2014/main" xmlns="" val="10002"/>
                   </a:ext>
                 </a:extLst>
               </a:tr>
@@ -25634,7 +29521,7 @@
                 </a:tc>
                 <a:extLst>
                   <a:ext uri="{0D108BD9-81ED-4DB2-BD59-A6C34878D82A}">
-                    <a16:rowId xmlns="" xmlns:a16="http://schemas.microsoft.com/office/drawing/2014/main" val="10003"/>
+                    <a16:rowId xmlns:a16="http://schemas.microsoft.com/office/drawing/2014/main" xmlns="" val="10003"/>
                   </a:ext>
                 </a:extLst>
               </a:tr>
@@ -26269,7 +30156,7 @@
   <a:extraClrSchemeLst/>
   <a:extLst>
     <a:ext uri="{05A4C25C-085E-4340-85A3-A5531E510DB2}">
-      <thm15:themeFamily xmlns="" xmlns:thm15="http://schemas.microsoft.com/office/thememl/2012/main" name="Office Theme" id="{62F939B6-93AF-4DB8-9C6B-D6C7DFDC589F}" vid="{4A3C46E8-61CC-4603-A589-7422A47A8E4A}"/>
+      <thm15:themeFamily xmlns:thm15="http://schemas.microsoft.com/office/thememl/2012/main" xmlns="" name="Office Theme" id="{62F939B6-93AF-4DB8-9C6B-D6C7DFDC589F}" vid="{4A3C46E8-61CC-4603-A589-7422A47A8E4A}"/>
     </a:ext>
   </a:extLst>
 </a:theme>
@@ -26530,7 +30417,7 @@
   <a:extraClrSchemeLst/>
   <a:extLst>
     <a:ext uri="{05A4C25C-085E-4340-85A3-A5531E510DB2}">
-      <thm15:themeFamily xmlns="" xmlns:thm15="http://schemas.microsoft.com/office/thememl/2012/main" name="Office Theme" id="{62F939B6-93AF-4DB8-9C6B-D6C7DFDC589F}" vid="{4A3C46E8-61CC-4603-A589-7422A47A8E4A}"/>
+      <thm15:themeFamily xmlns:thm15="http://schemas.microsoft.com/office/thememl/2012/main" xmlns="" name="Office Theme" id="{62F939B6-93AF-4DB8-9C6B-D6C7DFDC589F}" vid="{4A3C46E8-61CC-4603-A589-7422A47A8E4A}"/>
     </a:ext>
   </a:extLst>
 </a:theme>

</xml_diff>